<commit_message>
generated manuscript fig with stacked bar plot
</commit_message>
<xml_diff>
--- a/figs.pptx
+++ b/figs.pptx
@@ -8,6 +8,7 @@
     <p:sldId id="256" r:id="rId2"/>
     <p:sldId id="257" r:id="rId3"/>
     <p:sldId id="258" r:id="rId4"/>
+    <p:sldId id="259" r:id="rId5"/>
   </p:sldIdLst>
   <p:sldSz cx="12192000" cy="6858000"/>
   <p:notesSz cx="6858000" cy="9144000"/>
@@ -272,7 +273,7 @@
           <a:p>
             <a:fld id="{006E2D19-A327-0A4E-9249-AA848A1B4FF7}" type="datetimeFigureOut">
               <a:rPr lang="en-US" smtClean="0"/>
-              <a:t>3/9/20</a:t>
+              <a:t>4/8/20</a:t>
             </a:fld>
             <a:endParaRPr lang="en-US"/>
           </a:p>
@@ -470,7 +471,7 @@
           <a:p>
             <a:fld id="{006E2D19-A327-0A4E-9249-AA848A1B4FF7}" type="datetimeFigureOut">
               <a:rPr lang="en-US" smtClean="0"/>
-              <a:t>3/9/20</a:t>
+              <a:t>4/8/20</a:t>
             </a:fld>
             <a:endParaRPr lang="en-US"/>
           </a:p>
@@ -678,7 +679,7 @@
           <a:p>
             <a:fld id="{006E2D19-A327-0A4E-9249-AA848A1B4FF7}" type="datetimeFigureOut">
               <a:rPr lang="en-US" smtClean="0"/>
-              <a:t>3/9/20</a:t>
+              <a:t>4/8/20</a:t>
             </a:fld>
             <a:endParaRPr lang="en-US"/>
           </a:p>
@@ -876,7 +877,7 @@
           <a:p>
             <a:fld id="{006E2D19-A327-0A4E-9249-AA848A1B4FF7}" type="datetimeFigureOut">
               <a:rPr lang="en-US" smtClean="0"/>
-              <a:t>3/9/20</a:t>
+              <a:t>4/8/20</a:t>
             </a:fld>
             <a:endParaRPr lang="en-US"/>
           </a:p>
@@ -1151,7 +1152,7 @@
           <a:p>
             <a:fld id="{006E2D19-A327-0A4E-9249-AA848A1B4FF7}" type="datetimeFigureOut">
               <a:rPr lang="en-US" smtClean="0"/>
-              <a:t>3/9/20</a:t>
+              <a:t>4/8/20</a:t>
             </a:fld>
             <a:endParaRPr lang="en-US"/>
           </a:p>
@@ -1416,7 +1417,7 @@
           <a:p>
             <a:fld id="{006E2D19-A327-0A4E-9249-AA848A1B4FF7}" type="datetimeFigureOut">
               <a:rPr lang="en-US" smtClean="0"/>
-              <a:t>3/9/20</a:t>
+              <a:t>4/8/20</a:t>
             </a:fld>
             <a:endParaRPr lang="en-US"/>
           </a:p>
@@ -1828,7 +1829,7 @@
           <a:p>
             <a:fld id="{006E2D19-A327-0A4E-9249-AA848A1B4FF7}" type="datetimeFigureOut">
               <a:rPr lang="en-US" smtClean="0"/>
-              <a:t>3/9/20</a:t>
+              <a:t>4/8/20</a:t>
             </a:fld>
             <a:endParaRPr lang="en-US"/>
           </a:p>
@@ -1969,7 +1970,7 @@
           <a:p>
             <a:fld id="{006E2D19-A327-0A4E-9249-AA848A1B4FF7}" type="datetimeFigureOut">
               <a:rPr lang="en-US" smtClean="0"/>
-              <a:t>3/9/20</a:t>
+              <a:t>4/8/20</a:t>
             </a:fld>
             <a:endParaRPr lang="en-US"/>
           </a:p>
@@ -2082,7 +2083,7 @@
           <a:p>
             <a:fld id="{006E2D19-A327-0A4E-9249-AA848A1B4FF7}" type="datetimeFigureOut">
               <a:rPr lang="en-US" smtClean="0"/>
-              <a:t>3/9/20</a:t>
+              <a:t>4/8/20</a:t>
             </a:fld>
             <a:endParaRPr lang="en-US"/>
           </a:p>
@@ -2393,7 +2394,7 @@
           <a:p>
             <a:fld id="{006E2D19-A327-0A4E-9249-AA848A1B4FF7}" type="datetimeFigureOut">
               <a:rPr lang="en-US" smtClean="0"/>
-              <a:t>3/9/20</a:t>
+              <a:t>4/8/20</a:t>
             </a:fld>
             <a:endParaRPr lang="en-US"/>
           </a:p>
@@ -2681,7 +2682,7 @@
           <a:p>
             <a:fld id="{006E2D19-A327-0A4E-9249-AA848A1B4FF7}" type="datetimeFigureOut">
               <a:rPr lang="en-US" smtClean="0"/>
-              <a:t>3/9/20</a:t>
+              <a:t>4/8/20</a:t>
             </a:fld>
             <a:endParaRPr lang="en-US"/>
           </a:p>
@@ -2922,7 +2923,7 @@
           <a:p>
             <a:fld id="{006E2D19-A327-0A4E-9249-AA848A1B4FF7}" type="datetimeFigureOut">
               <a:rPr lang="en-US" smtClean="0"/>
-              <a:t>3/9/20</a:t>
+              <a:t>4/8/20</a:t>
             </a:fld>
             <a:endParaRPr lang="en-US"/>
           </a:p>
@@ -4937,6 +4938,483 @@
 </p:sld>
 </file>
 
+<file path=ppt/slides/slide4.xml><?xml version="1.0" encoding="utf-8"?>
+<p:sld xmlns:a="http://schemas.openxmlformats.org/drawingml/2006/main" xmlns:r="http://schemas.openxmlformats.org/officeDocument/2006/relationships" xmlns:p="http://schemas.openxmlformats.org/presentationml/2006/main">
+  <p:cSld>
+    <p:spTree>
+      <p:nvGrpSpPr>
+        <p:cNvPr id="1" name=""/>
+        <p:cNvGrpSpPr/>
+        <p:nvPr/>
+      </p:nvGrpSpPr>
+      <p:grpSpPr>
+        <a:xfrm>
+          <a:off x="0" y="0"/>
+          <a:ext cx="0" cy="0"/>
+          <a:chOff x="0" y="0"/>
+          <a:chExt cx="0" cy="0"/>
+        </a:xfrm>
+      </p:grpSpPr>
+      <p:pic>
+        <p:nvPicPr>
+          <p:cNvPr id="5" name="Picture 4">
+            <a:extLst>
+              <a:ext uri="{FF2B5EF4-FFF2-40B4-BE49-F238E27FC236}">
+                <a16:creationId xmlns:a16="http://schemas.microsoft.com/office/drawing/2014/main" id="{D8F4A6EF-95C3-D043-BF1B-43594DBA9706}"/>
+              </a:ext>
+            </a:extLst>
+          </p:cNvPr>
+          <p:cNvPicPr>
+            <a:picLocks noChangeAspect="1"/>
+          </p:cNvPicPr>
+          <p:nvPr/>
+        </p:nvPicPr>
+        <p:blipFill>
+          <a:blip r:embed="rId2"/>
+          <a:stretch>
+            <a:fillRect/>
+          </a:stretch>
+        </p:blipFill>
+        <p:spPr>
+          <a:xfrm>
+            <a:off x="1381125" y="0"/>
+            <a:ext cx="9429750" cy="6858000"/>
+          </a:xfrm>
+          <a:prstGeom prst="rect">
+            <a:avLst/>
+          </a:prstGeom>
+        </p:spPr>
+      </p:pic>
+      <p:sp>
+        <p:nvSpPr>
+          <p:cNvPr id="6" name="TextBox 5">
+            <a:extLst>
+              <a:ext uri="{FF2B5EF4-FFF2-40B4-BE49-F238E27FC236}">
+                <a16:creationId xmlns:a16="http://schemas.microsoft.com/office/drawing/2014/main" id="{2DFCE3C8-5A13-8B49-B6F5-6902421E6052}"/>
+              </a:ext>
+            </a:extLst>
+          </p:cNvPr>
+          <p:cNvSpPr txBox="1"/>
+          <p:nvPr/>
+        </p:nvSpPr>
+        <p:spPr>
+          <a:xfrm>
+            <a:off x="3060192" y="487680"/>
+            <a:ext cx="415498" cy="369332"/>
+          </a:xfrm>
+          <a:prstGeom prst="rect">
+            <a:avLst/>
+          </a:prstGeom>
+          <a:noFill/>
+        </p:spPr>
+        <p:txBody>
+          <a:bodyPr wrap="none" rtlCol="0">
+            <a:spAutoFit/>
+          </a:bodyPr>
+          <a:lstStyle/>
+          <a:p>
+            <a:r>
+              <a:rPr lang="en-US" dirty="0"/>
+              <a:t>**</a:t>
+            </a:r>
+          </a:p>
+        </p:txBody>
+      </p:sp>
+      <p:sp>
+        <p:nvSpPr>
+          <p:cNvPr id="7" name="TextBox 6">
+            <a:extLst>
+              <a:ext uri="{FF2B5EF4-FFF2-40B4-BE49-F238E27FC236}">
+                <a16:creationId xmlns:a16="http://schemas.microsoft.com/office/drawing/2014/main" id="{628273F0-9DF4-804B-ADC4-A259989344D5}"/>
+              </a:ext>
+            </a:extLst>
+          </p:cNvPr>
+          <p:cNvSpPr txBox="1"/>
+          <p:nvPr/>
+        </p:nvSpPr>
+        <p:spPr>
+          <a:xfrm>
+            <a:off x="3116434" y="1160026"/>
+            <a:ext cx="300082" cy="369332"/>
+          </a:xfrm>
+          <a:prstGeom prst="rect">
+            <a:avLst/>
+          </a:prstGeom>
+          <a:noFill/>
+        </p:spPr>
+        <p:txBody>
+          <a:bodyPr wrap="none" rtlCol="0">
+            <a:spAutoFit/>
+          </a:bodyPr>
+          <a:lstStyle/>
+          <a:p>
+            <a:r>
+              <a:rPr lang="en-US" dirty="0">
+                <a:solidFill>
+                  <a:schemeClr val="bg1">
+                    <a:lumMod val="50000"/>
+                  </a:schemeClr>
+                </a:solidFill>
+              </a:rPr>
+              <a:t>*</a:t>
+            </a:r>
+          </a:p>
+        </p:txBody>
+      </p:sp>
+      <p:sp>
+        <p:nvSpPr>
+          <p:cNvPr id="8" name="TextBox 7">
+            <a:extLst>
+              <a:ext uri="{FF2B5EF4-FFF2-40B4-BE49-F238E27FC236}">
+                <a16:creationId xmlns:a16="http://schemas.microsoft.com/office/drawing/2014/main" id="{F97865E3-5A3D-2640-A43C-8D134574059A}"/>
+              </a:ext>
+            </a:extLst>
+          </p:cNvPr>
+          <p:cNvSpPr txBox="1"/>
+          <p:nvPr/>
+        </p:nvSpPr>
+        <p:spPr>
+          <a:xfrm>
+            <a:off x="3116434" y="3244334"/>
+            <a:ext cx="300082" cy="369332"/>
+          </a:xfrm>
+          <a:prstGeom prst="rect">
+            <a:avLst/>
+          </a:prstGeom>
+          <a:noFill/>
+        </p:spPr>
+        <p:txBody>
+          <a:bodyPr wrap="none" rtlCol="0">
+            <a:spAutoFit/>
+          </a:bodyPr>
+          <a:lstStyle/>
+          <a:p>
+            <a:r>
+              <a:rPr lang="en-US" dirty="0">
+                <a:solidFill>
+                  <a:schemeClr val="bg1">
+                    <a:lumMod val="50000"/>
+                  </a:schemeClr>
+                </a:solidFill>
+              </a:rPr>
+              <a:t>*</a:t>
+            </a:r>
+          </a:p>
+        </p:txBody>
+      </p:sp>
+      <p:sp>
+        <p:nvSpPr>
+          <p:cNvPr id="9" name="TextBox 8">
+            <a:extLst>
+              <a:ext uri="{FF2B5EF4-FFF2-40B4-BE49-F238E27FC236}">
+                <a16:creationId xmlns:a16="http://schemas.microsoft.com/office/drawing/2014/main" id="{A67B829E-0D19-2944-90FE-67D591185874}"/>
+              </a:ext>
+            </a:extLst>
+          </p:cNvPr>
+          <p:cNvSpPr txBox="1"/>
+          <p:nvPr/>
+        </p:nvSpPr>
+        <p:spPr>
+          <a:xfrm>
+            <a:off x="5090060" y="487680"/>
+            <a:ext cx="300082" cy="369332"/>
+          </a:xfrm>
+          <a:prstGeom prst="rect">
+            <a:avLst/>
+          </a:prstGeom>
+          <a:noFill/>
+        </p:spPr>
+        <p:txBody>
+          <a:bodyPr wrap="none" rtlCol="0">
+            <a:spAutoFit/>
+          </a:bodyPr>
+          <a:lstStyle/>
+          <a:p>
+            <a:r>
+              <a:rPr lang="en-US" dirty="0"/>
+              <a:t>*</a:t>
+            </a:r>
+          </a:p>
+        </p:txBody>
+      </p:sp>
+      <p:sp>
+        <p:nvSpPr>
+          <p:cNvPr id="10" name="TextBox 9">
+            <a:extLst>
+              <a:ext uri="{FF2B5EF4-FFF2-40B4-BE49-F238E27FC236}">
+                <a16:creationId xmlns:a16="http://schemas.microsoft.com/office/drawing/2014/main" id="{A0DE985A-F2B0-6143-8CE2-AF3C8C05BC7E}"/>
+              </a:ext>
+            </a:extLst>
+          </p:cNvPr>
+          <p:cNvSpPr txBox="1"/>
+          <p:nvPr/>
+        </p:nvSpPr>
+        <p:spPr>
+          <a:xfrm>
+            <a:off x="8791415" y="491252"/>
+            <a:ext cx="530915" cy="369332"/>
+          </a:xfrm>
+          <a:prstGeom prst="rect">
+            <a:avLst/>
+          </a:prstGeom>
+          <a:noFill/>
+        </p:spPr>
+        <p:txBody>
+          <a:bodyPr wrap="none" rtlCol="0">
+            <a:spAutoFit/>
+          </a:bodyPr>
+          <a:lstStyle/>
+          <a:p>
+            <a:r>
+              <a:rPr lang="en-US" dirty="0"/>
+              <a:t>***</a:t>
+            </a:r>
+          </a:p>
+        </p:txBody>
+      </p:sp>
+      <p:sp>
+        <p:nvSpPr>
+          <p:cNvPr id="11" name="TextBox 10">
+            <a:extLst>
+              <a:ext uri="{FF2B5EF4-FFF2-40B4-BE49-F238E27FC236}">
+                <a16:creationId xmlns:a16="http://schemas.microsoft.com/office/drawing/2014/main" id="{37977360-9BF8-9A4C-93E1-92D3703A6D63}"/>
+              </a:ext>
+            </a:extLst>
+          </p:cNvPr>
+          <p:cNvSpPr txBox="1"/>
+          <p:nvPr/>
+        </p:nvSpPr>
+        <p:spPr>
+          <a:xfrm>
+            <a:off x="8906831" y="1444014"/>
+            <a:ext cx="300082" cy="369332"/>
+          </a:xfrm>
+          <a:prstGeom prst="rect">
+            <a:avLst/>
+          </a:prstGeom>
+          <a:noFill/>
+        </p:spPr>
+        <p:txBody>
+          <a:bodyPr wrap="none" rtlCol="0">
+            <a:spAutoFit/>
+          </a:bodyPr>
+          <a:lstStyle/>
+          <a:p>
+            <a:r>
+              <a:rPr lang="en-US" dirty="0"/>
+              <a:t>*</a:t>
+            </a:r>
+          </a:p>
+        </p:txBody>
+      </p:sp>
+      <p:sp>
+        <p:nvSpPr>
+          <p:cNvPr id="13" name="TextBox 12">
+            <a:extLst>
+              <a:ext uri="{FF2B5EF4-FFF2-40B4-BE49-F238E27FC236}">
+                <a16:creationId xmlns:a16="http://schemas.microsoft.com/office/drawing/2014/main" id="{1D5D8DB6-F64A-534A-990A-7AF8ECA2C5C3}"/>
+              </a:ext>
+            </a:extLst>
+          </p:cNvPr>
+          <p:cNvSpPr txBox="1"/>
+          <p:nvPr/>
+        </p:nvSpPr>
+        <p:spPr>
+          <a:xfrm>
+            <a:off x="8906831" y="2641354"/>
+            <a:ext cx="300082" cy="369332"/>
+          </a:xfrm>
+          <a:prstGeom prst="rect">
+            <a:avLst/>
+          </a:prstGeom>
+          <a:noFill/>
+        </p:spPr>
+        <p:txBody>
+          <a:bodyPr wrap="none" rtlCol="0">
+            <a:spAutoFit/>
+          </a:bodyPr>
+          <a:lstStyle/>
+          <a:p>
+            <a:r>
+              <a:rPr lang="en-US" dirty="0">
+                <a:solidFill>
+                  <a:schemeClr val="bg1">
+                    <a:lumMod val="50000"/>
+                  </a:schemeClr>
+                </a:solidFill>
+              </a:rPr>
+              <a:t>*</a:t>
+            </a:r>
+          </a:p>
+        </p:txBody>
+      </p:sp>
+      <p:sp>
+        <p:nvSpPr>
+          <p:cNvPr id="14" name="TextBox 13">
+            <a:extLst>
+              <a:ext uri="{FF2B5EF4-FFF2-40B4-BE49-F238E27FC236}">
+                <a16:creationId xmlns:a16="http://schemas.microsoft.com/office/drawing/2014/main" id="{7C570E75-8C10-AB4D-B1A8-ED41538D4270}"/>
+              </a:ext>
+            </a:extLst>
+          </p:cNvPr>
+          <p:cNvSpPr txBox="1"/>
+          <p:nvPr/>
+        </p:nvSpPr>
+        <p:spPr>
+          <a:xfrm>
+            <a:off x="9634654" y="4014439"/>
+            <a:ext cx="2720675" cy="1241365"/>
+          </a:xfrm>
+          <a:prstGeom prst="rect">
+            <a:avLst/>
+          </a:prstGeom>
+          <a:noFill/>
+        </p:spPr>
+        <p:txBody>
+          <a:bodyPr wrap="square" rtlCol="0">
+            <a:spAutoFit/>
+          </a:bodyPr>
+          <a:lstStyle/>
+          <a:p>
+            <a:r>
+              <a:rPr lang="en-US" sz="2800" baseline="-25000" dirty="0">
+                <a:latin typeface="Arial" panose="020B0604020202020204" pitchFamily="34" charset="0"/>
+                <a:cs typeface="Arial" panose="020B0604020202020204" pitchFamily="34" charset="0"/>
+              </a:rPr>
+              <a:t>***</a:t>
+            </a:r>
+            <a:r>
+              <a:rPr lang="en-US" sz="1200" dirty="0">
+                <a:latin typeface="Arial" panose="020B0604020202020204" pitchFamily="34" charset="0"/>
+                <a:cs typeface="Arial" panose="020B0604020202020204" pitchFamily="34" charset="0"/>
+              </a:rPr>
+              <a:t>  </a:t>
+            </a:r>
+            <a:r>
+              <a:rPr lang="en-US" sz="1200" dirty="0" err="1">
+                <a:latin typeface="Arial" panose="020B0604020202020204" pitchFamily="34" charset="0"/>
+                <a:cs typeface="Arial" panose="020B0604020202020204" pitchFamily="34" charset="0"/>
+              </a:rPr>
+              <a:t>adj.p</a:t>
+            </a:r>
+            <a:r>
+              <a:rPr lang="en-US" sz="1200" dirty="0">
+                <a:latin typeface="Arial" panose="020B0604020202020204" pitchFamily="34" charset="0"/>
+                <a:cs typeface="Arial" panose="020B0604020202020204" pitchFamily="34" charset="0"/>
+              </a:rPr>
+              <a:t> &lt; 0.0005</a:t>
+            </a:r>
+          </a:p>
+          <a:p>
+            <a:r>
+              <a:rPr lang="en-US" sz="2800" baseline="-25000" dirty="0">
+                <a:latin typeface="Arial" panose="020B0604020202020204" pitchFamily="34" charset="0"/>
+                <a:cs typeface="Arial" panose="020B0604020202020204" pitchFamily="34" charset="0"/>
+              </a:rPr>
+              <a:t>**</a:t>
+            </a:r>
+            <a:r>
+              <a:rPr lang="en-US" sz="1200" dirty="0">
+                <a:latin typeface="Arial" panose="020B0604020202020204" pitchFamily="34" charset="0"/>
+                <a:cs typeface="Arial" panose="020B0604020202020204" pitchFamily="34" charset="0"/>
+              </a:rPr>
+              <a:t>  </a:t>
+            </a:r>
+            <a:r>
+              <a:rPr lang="en-US" sz="1200" dirty="0" err="1">
+                <a:latin typeface="Arial" panose="020B0604020202020204" pitchFamily="34" charset="0"/>
+                <a:cs typeface="Arial" panose="020B0604020202020204" pitchFamily="34" charset="0"/>
+              </a:rPr>
+              <a:t>adj.p</a:t>
+            </a:r>
+            <a:r>
+              <a:rPr lang="en-US" sz="1200" dirty="0">
+                <a:latin typeface="Arial" panose="020B0604020202020204" pitchFamily="34" charset="0"/>
+                <a:cs typeface="Arial" panose="020B0604020202020204" pitchFamily="34" charset="0"/>
+              </a:rPr>
+              <a:t> &lt; 0.005</a:t>
+            </a:r>
+          </a:p>
+          <a:p>
+            <a:r>
+              <a:rPr lang="en-US" sz="2800" baseline="-25000" dirty="0">
+                <a:latin typeface="Arial" panose="020B0604020202020204" pitchFamily="34" charset="0"/>
+                <a:cs typeface="Arial" panose="020B0604020202020204" pitchFamily="34" charset="0"/>
+              </a:rPr>
+              <a:t>*</a:t>
+            </a:r>
+            <a:r>
+              <a:rPr lang="en-US" sz="1200" dirty="0">
+                <a:latin typeface="Arial" panose="020B0604020202020204" pitchFamily="34" charset="0"/>
+                <a:cs typeface="Arial" panose="020B0604020202020204" pitchFamily="34" charset="0"/>
+              </a:rPr>
+              <a:t>  </a:t>
+            </a:r>
+            <a:r>
+              <a:rPr lang="en-US" sz="1200" dirty="0" err="1">
+                <a:latin typeface="Arial" panose="020B0604020202020204" pitchFamily="34" charset="0"/>
+                <a:cs typeface="Arial" panose="020B0604020202020204" pitchFamily="34" charset="0"/>
+              </a:rPr>
+              <a:t>adj.p</a:t>
+            </a:r>
+            <a:r>
+              <a:rPr lang="en-US" sz="1200" dirty="0">
+                <a:latin typeface="Arial" panose="020B0604020202020204" pitchFamily="34" charset="0"/>
+                <a:cs typeface="Arial" panose="020B0604020202020204" pitchFamily="34" charset="0"/>
+              </a:rPr>
+              <a:t> &lt; 0.05</a:t>
+            </a:r>
+          </a:p>
+          <a:p>
+            <a:r>
+              <a:rPr lang="en-US" sz="2800" baseline="-25000" dirty="0">
+                <a:solidFill>
+                  <a:schemeClr val="bg1">
+                    <a:lumMod val="50000"/>
+                  </a:schemeClr>
+                </a:solidFill>
+                <a:latin typeface="Arial" panose="020B0604020202020204" pitchFamily="34" charset="0"/>
+                <a:cs typeface="Arial" panose="020B0604020202020204" pitchFamily="34" charset="0"/>
+              </a:rPr>
+              <a:t>*</a:t>
+            </a:r>
+            <a:r>
+              <a:rPr lang="en-US" sz="1200" dirty="0">
+                <a:latin typeface="Arial" panose="020B0604020202020204" pitchFamily="34" charset="0"/>
+                <a:cs typeface="Arial" panose="020B0604020202020204" pitchFamily="34" charset="0"/>
+              </a:rPr>
+              <a:t>  </a:t>
+            </a:r>
+            <a:r>
+              <a:rPr lang="en-US" sz="1200" dirty="0" err="1">
+                <a:latin typeface="Arial" panose="020B0604020202020204" pitchFamily="34" charset="0"/>
+                <a:cs typeface="Arial" panose="020B0604020202020204" pitchFamily="34" charset="0"/>
+              </a:rPr>
+              <a:t>adj.p</a:t>
+            </a:r>
+            <a:r>
+              <a:rPr lang="en-US" sz="1200" dirty="0">
+                <a:latin typeface="Arial" panose="020B0604020202020204" pitchFamily="34" charset="0"/>
+                <a:cs typeface="Arial" panose="020B0604020202020204" pitchFamily="34" charset="0"/>
+              </a:rPr>
+              <a:t> &lt; 0.05</a:t>
+            </a:r>
+          </a:p>
+        </p:txBody>
+      </p:sp>
+    </p:spTree>
+    <p:extLst>
+      <p:ext uri="{BB962C8B-B14F-4D97-AF65-F5344CB8AC3E}">
+        <p14:creationId xmlns:p14="http://schemas.microsoft.com/office/powerpoint/2010/main" val="4143407245"/>
+      </p:ext>
+    </p:extLst>
+  </p:cSld>
+  <p:clrMapOvr>
+    <a:masterClrMapping/>
+  </p:clrMapOvr>
+</p:sld>
+</file>
+
 <file path=ppt/theme/theme1.xml><?xml version="1.0" encoding="utf-8"?>
 <a:theme xmlns:a="http://schemas.openxmlformats.org/drawingml/2006/main" name="Office Theme">
   <a:themeElements>

</xml_diff>

<commit_message>
DMCpG proximity test for DMRfind
</commit_message>
<xml_diff>
--- a/figs.pptx
+++ b/figs.pptx
@@ -5,10 +5,10 @@
     <p:sldMasterId id="2147483648" r:id="rId1"/>
   </p:sldMasterIdLst>
   <p:sldIdLst>
-    <p:sldId id="256" r:id="rId2"/>
-    <p:sldId id="257" r:id="rId3"/>
-    <p:sldId id="258" r:id="rId4"/>
-    <p:sldId id="259" r:id="rId5"/>
+    <p:sldId id="262" r:id="rId2"/>
+    <p:sldId id="260" r:id="rId3"/>
+    <p:sldId id="261" r:id="rId4"/>
+    <p:sldId id="263" r:id="rId5"/>
   </p:sldIdLst>
   <p:sldSz cx="12192000" cy="6858000"/>
   <p:notesSz cx="6858000" cy="9144000"/>
@@ -110,7 +110,7 @@
   <p:extLst>
     <p:ext uri="{EFAFB233-063F-42B5-8137-9DF3F51BA10A}">
       <p15:sldGuideLst xmlns:p15="http://schemas.microsoft.com/office/powerpoint/2012/main">
-        <p15:guide id="1" orient="horz" pos="2160" userDrawn="1">
+        <p15:guide id="1" orient="horz" pos="528" userDrawn="1">
           <p15:clr>
             <a:srgbClr val="A4A3A4"/>
           </p15:clr>
@@ -273,7 +273,7 @@
           <a:p>
             <a:fld id="{006E2D19-A327-0A4E-9249-AA848A1B4FF7}" type="datetimeFigureOut">
               <a:rPr lang="en-US" smtClean="0"/>
-              <a:t>4/8/20</a:t>
+              <a:t>4/15/20</a:t>
             </a:fld>
             <a:endParaRPr lang="en-US"/>
           </a:p>
@@ -471,7 +471,7 @@
           <a:p>
             <a:fld id="{006E2D19-A327-0A4E-9249-AA848A1B4FF7}" type="datetimeFigureOut">
               <a:rPr lang="en-US" smtClean="0"/>
-              <a:t>4/8/20</a:t>
+              <a:t>4/15/20</a:t>
             </a:fld>
             <a:endParaRPr lang="en-US"/>
           </a:p>
@@ -679,7 +679,7 @@
           <a:p>
             <a:fld id="{006E2D19-A327-0A4E-9249-AA848A1B4FF7}" type="datetimeFigureOut">
               <a:rPr lang="en-US" smtClean="0"/>
-              <a:t>4/8/20</a:t>
+              <a:t>4/15/20</a:t>
             </a:fld>
             <a:endParaRPr lang="en-US"/>
           </a:p>
@@ -877,7 +877,7 @@
           <a:p>
             <a:fld id="{006E2D19-A327-0A4E-9249-AA848A1B4FF7}" type="datetimeFigureOut">
               <a:rPr lang="en-US" smtClean="0"/>
-              <a:t>4/8/20</a:t>
+              <a:t>4/15/20</a:t>
             </a:fld>
             <a:endParaRPr lang="en-US"/>
           </a:p>
@@ -1152,7 +1152,7 @@
           <a:p>
             <a:fld id="{006E2D19-A327-0A4E-9249-AA848A1B4FF7}" type="datetimeFigureOut">
               <a:rPr lang="en-US" smtClean="0"/>
-              <a:t>4/8/20</a:t>
+              <a:t>4/15/20</a:t>
             </a:fld>
             <a:endParaRPr lang="en-US"/>
           </a:p>
@@ -1417,7 +1417,7 @@
           <a:p>
             <a:fld id="{006E2D19-A327-0A4E-9249-AA848A1B4FF7}" type="datetimeFigureOut">
               <a:rPr lang="en-US" smtClean="0"/>
-              <a:t>4/8/20</a:t>
+              <a:t>4/15/20</a:t>
             </a:fld>
             <a:endParaRPr lang="en-US"/>
           </a:p>
@@ -1829,7 +1829,7 @@
           <a:p>
             <a:fld id="{006E2D19-A327-0A4E-9249-AA848A1B4FF7}" type="datetimeFigureOut">
               <a:rPr lang="en-US" smtClean="0"/>
-              <a:t>4/8/20</a:t>
+              <a:t>4/15/20</a:t>
             </a:fld>
             <a:endParaRPr lang="en-US"/>
           </a:p>
@@ -1970,7 +1970,7 @@
           <a:p>
             <a:fld id="{006E2D19-A327-0A4E-9249-AA848A1B4FF7}" type="datetimeFigureOut">
               <a:rPr lang="en-US" smtClean="0"/>
-              <a:t>4/8/20</a:t>
+              <a:t>4/15/20</a:t>
             </a:fld>
             <a:endParaRPr lang="en-US"/>
           </a:p>
@@ -2083,7 +2083,7 @@
           <a:p>
             <a:fld id="{006E2D19-A327-0A4E-9249-AA848A1B4FF7}" type="datetimeFigureOut">
               <a:rPr lang="en-US" smtClean="0"/>
-              <a:t>4/8/20</a:t>
+              <a:t>4/15/20</a:t>
             </a:fld>
             <a:endParaRPr lang="en-US"/>
           </a:p>
@@ -2394,7 +2394,7 @@
           <a:p>
             <a:fld id="{006E2D19-A327-0A4E-9249-AA848A1B4FF7}" type="datetimeFigureOut">
               <a:rPr lang="en-US" smtClean="0"/>
-              <a:t>4/8/20</a:t>
+              <a:t>4/15/20</a:t>
             </a:fld>
             <a:endParaRPr lang="en-US"/>
           </a:p>
@@ -2682,7 +2682,7 @@
           <a:p>
             <a:fld id="{006E2D19-A327-0A4E-9249-AA848A1B4FF7}" type="datetimeFigureOut">
               <a:rPr lang="en-US" smtClean="0"/>
-              <a:t>4/8/20</a:t>
+              <a:t>4/15/20</a:t>
             </a:fld>
             <a:endParaRPr lang="en-US"/>
           </a:p>
@@ -2923,7 +2923,7 @@
           <a:p>
             <a:fld id="{006E2D19-A327-0A4E-9249-AA848A1B4FF7}" type="datetimeFigureOut">
               <a:rPr lang="en-US" smtClean="0"/>
-              <a:t>4/8/20</a:t>
+              <a:t>4/15/20</a:t>
             </a:fld>
             <a:endParaRPr lang="en-US"/>
           </a:p>
@@ -3342,10 +3342,10 @@
       </p:grpSpPr>
       <p:pic>
         <p:nvPicPr>
-          <p:cNvPr id="23" name="Picture 22">
-            <a:extLst>
-              <a:ext uri="{FF2B5EF4-FFF2-40B4-BE49-F238E27FC236}">
-                <a16:creationId xmlns:a16="http://schemas.microsoft.com/office/drawing/2014/main" id="{10C9A533-8AAC-F94B-8C1F-C6EE6C9C1050}"/>
+          <p:cNvPr id="5" name="Picture 4">
+            <a:extLst>
+              <a:ext uri="{FF2B5EF4-FFF2-40B4-BE49-F238E27FC236}">
+                <a16:creationId xmlns:a16="http://schemas.microsoft.com/office/drawing/2014/main" id="{5D14A13F-68DA-C241-B544-5DCA53EF6A38}"/>
               </a:ext>
             </a:extLst>
           </p:cNvPr>
@@ -3354,114 +3354,28 @@
           </p:cNvPicPr>
           <p:nvPr/>
         </p:nvPicPr>
-        <p:blipFill rotWithShape="1">
+        <p:blipFill>
           <a:blip r:embed="rId2"/>
-          <a:srcRect t="29420" r="23016"/>
-          <a:stretch/>
+          <a:stretch>
+            <a:fillRect/>
+          </a:stretch>
         </p:blipFill>
         <p:spPr>
           <a:xfrm>
-            <a:off x="9427478" y="376517"/>
-            <a:ext cx="2592264" cy="2970797"/>
+            <a:off x="35171" y="0"/>
+            <a:ext cx="8229600" cy="6858000"/>
           </a:xfrm>
           <a:prstGeom prst="rect">
             <a:avLst/>
           </a:prstGeom>
         </p:spPr>
       </p:pic>
-      <p:pic>
-        <p:nvPicPr>
-          <p:cNvPr id="11" name="Picture 10">
-            <a:extLst>
-              <a:ext uri="{FF2B5EF4-FFF2-40B4-BE49-F238E27FC236}">
-                <a16:creationId xmlns:a16="http://schemas.microsoft.com/office/drawing/2014/main" id="{29D2AFD0-8F18-8D4F-B2C9-4231BC02F505}"/>
-              </a:ext>
-            </a:extLst>
-          </p:cNvPr>
-          <p:cNvPicPr>
-            <a:picLocks noChangeAspect="1"/>
-          </p:cNvPicPr>
-          <p:nvPr/>
-        </p:nvPicPr>
-        <p:blipFill rotWithShape="1">
-          <a:blip r:embed="rId3"/>
-          <a:srcRect t="29695" r="21358"/>
-          <a:stretch/>
-        </p:blipFill>
-        <p:spPr>
-          <a:xfrm>
-            <a:off x="6772276" y="326154"/>
-            <a:ext cx="2413000" cy="2696445"/>
-          </a:xfrm>
-          <a:prstGeom prst="rect">
-            <a:avLst/>
-          </a:prstGeom>
-        </p:spPr>
-      </p:pic>
-      <p:pic>
-        <p:nvPicPr>
-          <p:cNvPr id="15" name="Picture 14">
-            <a:extLst>
-              <a:ext uri="{FF2B5EF4-FFF2-40B4-BE49-F238E27FC236}">
-                <a16:creationId xmlns:a16="http://schemas.microsoft.com/office/drawing/2014/main" id="{4F1F5AC3-40A5-0148-8D92-B92F37AB6075}"/>
-              </a:ext>
-            </a:extLst>
-          </p:cNvPr>
-          <p:cNvPicPr>
-            <a:picLocks noChangeAspect="1"/>
-          </p:cNvPicPr>
-          <p:nvPr/>
-        </p:nvPicPr>
-        <p:blipFill rotWithShape="1">
-          <a:blip r:embed="rId4"/>
-          <a:srcRect t="29708" r="23611"/>
-          <a:stretch/>
-        </p:blipFill>
-        <p:spPr>
-          <a:xfrm>
-            <a:off x="3442020" y="285386"/>
-            <a:ext cx="3174682" cy="3651614"/>
-          </a:xfrm>
-          <a:prstGeom prst="rect">
-            <a:avLst/>
-          </a:prstGeom>
-        </p:spPr>
-      </p:pic>
-      <p:pic>
-        <p:nvPicPr>
-          <p:cNvPr id="17" name="Picture 16">
-            <a:extLst>
-              <a:ext uri="{FF2B5EF4-FFF2-40B4-BE49-F238E27FC236}">
-                <a16:creationId xmlns:a16="http://schemas.microsoft.com/office/drawing/2014/main" id="{4F1AEB96-250F-844A-9D08-D5982F0023B3}"/>
-              </a:ext>
-            </a:extLst>
-          </p:cNvPr>
-          <p:cNvPicPr>
-            <a:picLocks noChangeAspect="1"/>
-          </p:cNvPicPr>
-          <p:nvPr/>
-        </p:nvPicPr>
-        <p:blipFill rotWithShape="1">
-          <a:blip r:embed="rId5"/>
-          <a:srcRect t="29709" r="23611" b="-1"/>
-          <a:stretch/>
-        </p:blipFill>
-        <p:spPr>
-          <a:xfrm>
-            <a:off x="31750" y="285386"/>
-            <a:ext cx="3174682" cy="3651614"/>
-          </a:xfrm>
-          <a:prstGeom prst="rect">
-            <a:avLst/>
-          </a:prstGeom>
-        </p:spPr>
-      </p:pic>
-      <p:sp>
-        <p:nvSpPr>
-          <p:cNvPr id="18" name="TextBox 17">
-            <a:extLst>
-              <a:ext uri="{FF2B5EF4-FFF2-40B4-BE49-F238E27FC236}">
-                <a16:creationId xmlns:a16="http://schemas.microsoft.com/office/drawing/2014/main" id="{09B659F1-B86F-AC4E-85EF-52C47441CB77}"/>
+      <p:sp>
+        <p:nvSpPr>
+          <p:cNvPr id="6" name="TextBox 5">
+            <a:extLst>
+              <a:ext uri="{FF2B5EF4-FFF2-40B4-BE49-F238E27FC236}">
+                <a16:creationId xmlns:a16="http://schemas.microsoft.com/office/drawing/2014/main" id="{0CCF473D-E164-9146-A287-60CA63A204AE}"/>
               </a:ext>
             </a:extLst>
           </p:cNvPr>
@@ -3470,8 +3384,8 @@
         </p:nvSpPr>
         <p:spPr>
           <a:xfrm>
-            <a:off x="107950" y="47153"/>
-            <a:ext cx="324128" cy="369332"/>
+            <a:off x="2015153" y="3009874"/>
+            <a:ext cx="300082" cy="369332"/>
           </a:xfrm>
           <a:prstGeom prst="rect">
             <a:avLst/>
@@ -3485,18 +3399,18 @@
           <a:lstStyle/>
           <a:p>
             <a:r>
-              <a:rPr lang="en-US" b="1" dirty="0"/>
-              <a:t>A</a:t>
-            </a:r>
-          </a:p>
-        </p:txBody>
-      </p:sp>
-      <p:sp>
-        <p:nvSpPr>
-          <p:cNvPr id="19" name="TextBox 18">
-            <a:extLst>
-              <a:ext uri="{FF2B5EF4-FFF2-40B4-BE49-F238E27FC236}">
-                <a16:creationId xmlns:a16="http://schemas.microsoft.com/office/drawing/2014/main" id="{05996D70-29F8-2349-86F3-3CE1E8DA0D6B}"/>
+              <a:rPr lang="en-US" dirty="0"/>
+              <a:t>*</a:t>
+            </a:r>
+          </a:p>
+        </p:txBody>
+      </p:sp>
+      <p:sp>
+        <p:nvSpPr>
+          <p:cNvPr id="7" name="TextBox 6">
+            <a:extLst>
+              <a:ext uri="{FF2B5EF4-FFF2-40B4-BE49-F238E27FC236}">
+                <a16:creationId xmlns:a16="http://schemas.microsoft.com/office/drawing/2014/main" id="{AA94053C-53D4-D649-AA54-6EB8094FD00D}"/>
               </a:ext>
             </a:extLst>
           </p:cNvPr>
@@ -3505,8 +3419,8 @@
         </p:nvSpPr>
         <p:spPr>
           <a:xfrm>
-            <a:off x="3442020" y="88900"/>
-            <a:ext cx="324128" cy="369332"/>
+            <a:off x="5471300" y="3218742"/>
+            <a:ext cx="530915" cy="369332"/>
           </a:xfrm>
           <a:prstGeom prst="rect">
             <a:avLst/>
@@ -3520,18 +3434,18 @@
           <a:lstStyle/>
           <a:p>
             <a:r>
-              <a:rPr lang="en-US" b="1" dirty="0"/>
-              <a:t>B</a:t>
-            </a:r>
-          </a:p>
-        </p:txBody>
-      </p:sp>
-      <p:sp>
-        <p:nvSpPr>
-          <p:cNvPr id="20" name="TextBox 19">
-            <a:extLst>
-              <a:ext uri="{FF2B5EF4-FFF2-40B4-BE49-F238E27FC236}">
-                <a16:creationId xmlns:a16="http://schemas.microsoft.com/office/drawing/2014/main" id="{83C85662-7BF8-B243-AA5C-86F665D911D1}"/>
+              <a:rPr lang="en-US" dirty="0"/>
+              <a:t>***</a:t>
+            </a:r>
+          </a:p>
+        </p:txBody>
+      </p:sp>
+      <p:sp>
+        <p:nvSpPr>
+          <p:cNvPr id="8" name="TextBox 7">
+            <a:extLst>
+              <a:ext uri="{FF2B5EF4-FFF2-40B4-BE49-F238E27FC236}">
+                <a16:creationId xmlns:a16="http://schemas.microsoft.com/office/drawing/2014/main" id="{164203A7-950A-B641-9ED8-503DE1EDD0A8}"/>
               </a:ext>
             </a:extLst>
           </p:cNvPr>
@@ -3540,8 +3454,8 @@
         </p:nvSpPr>
         <p:spPr>
           <a:xfrm>
-            <a:off x="6862942" y="41624"/>
-            <a:ext cx="306494" cy="369332"/>
+            <a:off x="5557674" y="661839"/>
+            <a:ext cx="300082" cy="369332"/>
           </a:xfrm>
           <a:prstGeom prst="rect">
             <a:avLst/>
@@ -3555,18 +3469,18 @@
           <a:lstStyle/>
           <a:p>
             <a:r>
-              <a:rPr lang="en-US" b="1" dirty="0"/>
-              <a:t>C</a:t>
-            </a:r>
-          </a:p>
-        </p:txBody>
-      </p:sp>
-      <p:sp>
-        <p:nvSpPr>
-          <p:cNvPr id="21" name="TextBox 20">
-            <a:extLst>
-              <a:ext uri="{FF2B5EF4-FFF2-40B4-BE49-F238E27FC236}">
-                <a16:creationId xmlns:a16="http://schemas.microsoft.com/office/drawing/2014/main" id="{F8CE63BF-84B3-DD4B-BC39-21A9ABF724C5}"/>
+              <a:rPr lang="en-US" dirty="0"/>
+              <a:t>*</a:t>
+            </a:r>
+          </a:p>
+        </p:txBody>
+      </p:sp>
+      <p:sp>
+        <p:nvSpPr>
+          <p:cNvPr id="9" name="TextBox 8">
+            <a:extLst>
+              <a:ext uri="{FF2B5EF4-FFF2-40B4-BE49-F238E27FC236}">
+                <a16:creationId xmlns:a16="http://schemas.microsoft.com/office/drawing/2014/main" id="{F397D641-F5AD-7A40-AF46-8C7AC80C7B09}"/>
               </a:ext>
             </a:extLst>
           </p:cNvPr>
@@ -3575,8 +3489,8 @@
         </p:nvSpPr>
         <p:spPr>
           <a:xfrm>
-            <a:off x="9407002" y="41624"/>
-            <a:ext cx="330540" cy="369332"/>
+            <a:off x="5557674" y="1755624"/>
+            <a:ext cx="300082" cy="369332"/>
           </a:xfrm>
           <a:prstGeom prst="rect">
             <a:avLst/>
@@ -3590,18 +3504,24 @@
           <a:lstStyle/>
           <a:p>
             <a:r>
-              <a:rPr lang="en-US" b="1" dirty="0"/>
-              <a:t>D</a:t>
-            </a:r>
-          </a:p>
-        </p:txBody>
-      </p:sp>
-      <p:sp>
-        <p:nvSpPr>
-          <p:cNvPr id="24" name="TextBox 23">
-            <a:extLst>
-              <a:ext uri="{FF2B5EF4-FFF2-40B4-BE49-F238E27FC236}">
-                <a16:creationId xmlns:a16="http://schemas.microsoft.com/office/drawing/2014/main" id="{76F9E63B-1645-8A49-9BA6-B6882C1CFF5C}"/>
+              <a:rPr lang="en-US" dirty="0">
+                <a:solidFill>
+                  <a:schemeClr val="bg1">
+                    <a:lumMod val="50000"/>
+                  </a:schemeClr>
+                </a:solidFill>
+              </a:rPr>
+              <a:t>*</a:t>
+            </a:r>
+          </a:p>
+        </p:txBody>
+      </p:sp>
+      <p:sp>
+        <p:nvSpPr>
+          <p:cNvPr id="10" name="TextBox 9">
+            <a:extLst>
+              <a:ext uri="{FF2B5EF4-FFF2-40B4-BE49-F238E27FC236}">
+                <a16:creationId xmlns:a16="http://schemas.microsoft.com/office/drawing/2014/main" id="{5A4F18BD-564B-1143-A2E7-B468067BE695}"/>
               </a:ext>
             </a:extLst>
           </p:cNvPr>
@@ -3609,717 +3529,143 @@
           <p:nvPr/>
         </p:nvSpPr>
         <p:spPr>
-          <a:xfrm rot="16200000">
-            <a:off x="4611726" y="3867051"/>
-            <a:ext cx="567784" cy="246221"/>
+          <a:xfrm>
+            <a:off x="6469424" y="4470663"/>
+            <a:ext cx="2720675" cy="1241365"/>
           </a:xfrm>
           <a:prstGeom prst="rect">
             <a:avLst/>
           </a:prstGeom>
-          <a:solidFill>
-            <a:schemeClr val="bg1"/>
-          </a:solidFill>
-        </p:spPr>
-        <p:txBody>
-          <a:bodyPr wrap="none" rtlCol="0">
+          <a:noFill/>
+        </p:spPr>
+        <p:txBody>
+          <a:bodyPr wrap="square" rtlCol="0">
             <a:spAutoFit/>
           </a:bodyPr>
           <a:lstStyle/>
           <a:p>
-            <a:pPr algn="r"/>
-            <a:r>
-              <a:rPr lang="en-US" sz="1000" b="1" dirty="0">
+            <a:r>
+              <a:rPr lang="en-US" sz="2800" baseline="-25000" dirty="0">
                 <a:latin typeface="Arial" panose="020B0604020202020204" pitchFamily="34" charset="0"/>
                 <a:cs typeface="Arial" panose="020B0604020202020204" pitchFamily="34" charset="0"/>
               </a:rPr>
-              <a:t>pH 8.0</a:t>
-            </a:r>
-          </a:p>
-        </p:txBody>
-      </p:sp>
-      <p:sp>
-        <p:nvSpPr>
-          <p:cNvPr id="25" name="TextBox 24">
-            <a:extLst>
-              <a:ext uri="{FF2B5EF4-FFF2-40B4-BE49-F238E27FC236}">
-                <a16:creationId xmlns:a16="http://schemas.microsoft.com/office/drawing/2014/main" id="{0704E1E3-FF16-2947-955F-840B88AAAB2A}"/>
-              </a:ext>
-            </a:extLst>
-          </p:cNvPr>
-          <p:cNvSpPr txBox="1"/>
-          <p:nvPr/>
-        </p:nvSpPr>
-        <p:spPr>
-          <a:xfrm rot="16200000">
-            <a:off x="5287602" y="3867051"/>
-            <a:ext cx="567784" cy="246221"/>
-          </a:xfrm>
-          <a:prstGeom prst="rect">
-            <a:avLst/>
-          </a:prstGeom>
-          <a:solidFill>
-            <a:schemeClr val="bg1"/>
-          </a:solidFill>
-        </p:spPr>
-        <p:txBody>
-          <a:bodyPr wrap="none" rtlCol="0">
-            <a:spAutoFit/>
-          </a:bodyPr>
-          <a:lstStyle/>
-          <a:p>
-            <a:pPr algn="r"/>
-            <a:r>
-              <a:rPr lang="en-US" sz="1000" b="1" dirty="0">
+              <a:t>***</a:t>
+            </a:r>
+            <a:r>
+              <a:rPr lang="en-US" sz="1200" dirty="0">
                 <a:latin typeface="Arial" panose="020B0604020202020204" pitchFamily="34" charset="0"/>
                 <a:cs typeface="Arial" panose="020B0604020202020204" pitchFamily="34" charset="0"/>
               </a:rPr>
-              <a:t>pH 7.4</a:t>
-            </a:r>
-          </a:p>
-        </p:txBody>
-      </p:sp>
-      <p:sp>
-        <p:nvSpPr>
-          <p:cNvPr id="26" name="TextBox 25">
-            <a:extLst>
-              <a:ext uri="{FF2B5EF4-FFF2-40B4-BE49-F238E27FC236}">
-                <a16:creationId xmlns:a16="http://schemas.microsoft.com/office/drawing/2014/main" id="{EB8F87BA-20DA-4B4E-88B9-42DEECFAF95B}"/>
-              </a:ext>
-            </a:extLst>
-          </p:cNvPr>
-          <p:cNvSpPr txBox="1"/>
-          <p:nvPr/>
-        </p:nvSpPr>
-        <p:spPr>
-          <a:xfrm rot="16200000">
-            <a:off x="5963478" y="3867051"/>
-            <a:ext cx="567784" cy="246221"/>
-          </a:xfrm>
-          <a:prstGeom prst="rect">
-            <a:avLst/>
-          </a:prstGeom>
-          <a:solidFill>
-            <a:schemeClr val="bg1"/>
-          </a:solidFill>
-        </p:spPr>
-        <p:txBody>
-          <a:bodyPr wrap="none" rtlCol="0">
-            <a:spAutoFit/>
-          </a:bodyPr>
-          <a:lstStyle/>
-          <a:p>
-            <a:pPr algn="r"/>
-            <a:r>
-              <a:rPr lang="en-US" sz="1000" b="1" dirty="0">
+              <a:t>  </a:t>
+            </a:r>
+            <a:r>
+              <a:rPr lang="en-US" sz="1200" dirty="0" err="1">
                 <a:latin typeface="Arial" panose="020B0604020202020204" pitchFamily="34" charset="0"/>
                 <a:cs typeface="Arial" panose="020B0604020202020204" pitchFamily="34" charset="0"/>
               </a:rPr>
-              <a:t>pH 7.0</a:t>
-            </a:r>
-          </a:p>
-        </p:txBody>
-      </p:sp>
-      <p:sp>
-        <p:nvSpPr>
-          <p:cNvPr id="27" name="TextBox 26">
-            <a:extLst>
-              <a:ext uri="{FF2B5EF4-FFF2-40B4-BE49-F238E27FC236}">
-                <a16:creationId xmlns:a16="http://schemas.microsoft.com/office/drawing/2014/main" id="{04ACF3D2-C0E9-8443-9859-9ADC072B69D5}"/>
-              </a:ext>
-            </a:extLst>
-          </p:cNvPr>
-          <p:cNvSpPr txBox="1"/>
-          <p:nvPr/>
-        </p:nvSpPr>
-        <p:spPr>
-          <a:xfrm rot="16200000">
-            <a:off x="7597370" y="3010265"/>
-            <a:ext cx="567784" cy="246221"/>
-          </a:xfrm>
-          <a:prstGeom prst="rect">
-            <a:avLst/>
-          </a:prstGeom>
-          <a:solidFill>
-            <a:schemeClr val="bg1"/>
-          </a:solidFill>
-        </p:spPr>
-        <p:txBody>
-          <a:bodyPr wrap="none" rtlCol="0">
-            <a:spAutoFit/>
-          </a:bodyPr>
-          <a:lstStyle/>
-          <a:p>
-            <a:pPr algn="r"/>
-            <a:r>
-              <a:rPr lang="en-US" sz="1000" b="1" dirty="0">
+              <a:t>adj.p</a:t>
+            </a:r>
+            <a:r>
+              <a:rPr lang="en-US" sz="1200" dirty="0">
                 <a:latin typeface="Arial" panose="020B0604020202020204" pitchFamily="34" charset="0"/>
                 <a:cs typeface="Arial" panose="020B0604020202020204" pitchFamily="34" charset="0"/>
               </a:rPr>
-              <a:t>pH 8.0</a:t>
-            </a:r>
-          </a:p>
-        </p:txBody>
-      </p:sp>
-      <p:sp>
-        <p:nvSpPr>
-          <p:cNvPr id="28" name="TextBox 27">
-            <a:extLst>
-              <a:ext uri="{FF2B5EF4-FFF2-40B4-BE49-F238E27FC236}">
-                <a16:creationId xmlns:a16="http://schemas.microsoft.com/office/drawing/2014/main" id="{93E25EE7-FE86-3D41-8575-E165DEC4CFEA}"/>
-              </a:ext>
-            </a:extLst>
-          </p:cNvPr>
-          <p:cNvSpPr txBox="1"/>
-          <p:nvPr/>
-        </p:nvSpPr>
-        <p:spPr>
-          <a:xfrm rot="16200000">
-            <a:off x="8085793" y="3021997"/>
-            <a:ext cx="567784" cy="246221"/>
-          </a:xfrm>
-          <a:prstGeom prst="rect">
-            <a:avLst/>
-          </a:prstGeom>
-          <a:solidFill>
-            <a:schemeClr val="bg1"/>
-          </a:solidFill>
-        </p:spPr>
-        <p:txBody>
-          <a:bodyPr wrap="none" rtlCol="0">
-            <a:spAutoFit/>
-          </a:bodyPr>
-          <a:lstStyle/>
-          <a:p>
-            <a:pPr algn="r"/>
-            <a:r>
-              <a:rPr lang="en-US" sz="1000" b="1" dirty="0">
+              <a:t> &lt; 0.0005</a:t>
+            </a:r>
+          </a:p>
+          <a:p>
+            <a:r>
+              <a:rPr lang="en-US" sz="2800" baseline="-25000" dirty="0">
                 <a:latin typeface="Arial" panose="020B0604020202020204" pitchFamily="34" charset="0"/>
                 <a:cs typeface="Arial" panose="020B0604020202020204" pitchFamily="34" charset="0"/>
               </a:rPr>
-              <a:t>pH 7.4</a:t>
-            </a:r>
-          </a:p>
-        </p:txBody>
-      </p:sp>
-      <p:sp>
-        <p:nvSpPr>
-          <p:cNvPr id="29" name="TextBox 28">
-            <a:extLst>
-              <a:ext uri="{FF2B5EF4-FFF2-40B4-BE49-F238E27FC236}">
-                <a16:creationId xmlns:a16="http://schemas.microsoft.com/office/drawing/2014/main" id="{CA1CE832-43E4-D240-92DF-58541ED42B7A}"/>
-              </a:ext>
-            </a:extLst>
-          </p:cNvPr>
-          <p:cNvSpPr txBox="1"/>
-          <p:nvPr/>
-        </p:nvSpPr>
-        <p:spPr>
-          <a:xfrm rot="16200000">
-            <a:off x="8574216" y="3010265"/>
-            <a:ext cx="567784" cy="246221"/>
-          </a:xfrm>
-          <a:prstGeom prst="rect">
-            <a:avLst/>
-          </a:prstGeom>
-          <a:solidFill>
-            <a:schemeClr val="bg1"/>
-          </a:solidFill>
-        </p:spPr>
-        <p:txBody>
-          <a:bodyPr wrap="none" rtlCol="0">
-            <a:spAutoFit/>
-          </a:bodyPr>
-          <a:lstStyle/>
-          <a:p>
-            <a:pPr algn="r"/>
-            <a:r>
-              <a:rPr lang="en-US" sz="1000" b="1" dirty="0">
+              <a:t>**</a:t>
+            </a:r>
+            <a:r>
+              <a:rPr lang="en-US" sz="1200" dirty="0">
                 <a:latin typeface="Arial" panose="020B0604020202020204" pitchFamily="34" charset="0"/>
                 <a:cs typeface="Arial" panose="020B0604020202020204" pitchFamily="34" charset="0"/>
               </a:rPr>
-              <a:t>pH 7.0</a:t>
-            </a:r>
-          </a:p>
-        </p:txBody>
-      </p:sp>
-      <p:sp>
-        <p:nvSpPr>
-          <p:cNvPr id="30" name="TextBox 29">
-            <a:extLst>
-              <a:ext uri="{FF2B5EF4-FFF2-40B4-BE49-F238E27FC236}">
-                <a16:creationId xmlns:a16="http://schemas.microsoft.com/office/drawing/2014/main" id="{78F0F476-3D61-B547-B87E-506554DCB3F2}"/>
-              </a:ext>
-            </a:extLst>
-          </p:cNvPr>
-          <p:cNvSpPr txBox="1"/>
-          <p:nvPr/>
-        </p:nvSpPr>
-        <p:spPr>
-          <a:xfrm rot="16200000">
-            <a:off x="9889060" y="3595230"/>
-            <a:ext cx="1146468" cy="246221"/>
-          </a:xfrm>
-          <a:prstGeom prst="rect">
-            <a:avLst/>
-          </a:prstGeom>
-          <a:solidFill>
-            <a:schemeClr val="bg1"/>
-          </a:solidFill>
-        </p:spPr>
-        <p:txBody>
-          <a:bodyPr wrap="none" rtlCol="0">
-            <a:spAutoFit/>
-          </a:bodyPr>
-          <a:lstStyle/>
-          <a:p>
-            <a:pPr algn="r"/>
-            <a:r>
-              <a:rPr lang="en-US" sz="1000" b="1" dirty="0">
+              <a:t>  </a:t>
+            </a:r>
+            <a:r>
+              <a:rPr lang="en-US" sz="1200" dirty="0" err="1">
                 <a:latin typeface="Arial" panose="020B0604020202020204" pitchFamily="34" charset="0"/>
                 <a:cs typeface="Arial" panose="020B0604020202020204" pitchFamily="34" charset="0"/>
               </a:rPr>
-              <a:t>pH 8.0 </a:t>
-            </a:r>
-            <a:r>
-              <a:rPr lang="en-US" sz="1000" b="1" dirty="0">
-                <a:latin typeface="Arial" panose="020B0604020202020204" pitchFamily="34" charset="0"/>
-                <a:cs typeface="Arial" panose="020B0604020202020204" pitchFamily="34" charset="0"/>
-                <a:sym typeface="Wingdings" pitchFamily="2" charset="2"/>
-              </a:rPr>
-              <a:t> pH 8.0</a:t>
-            </a:r>
-            <a:endParaRPr lang="en-US" sz="1000" b="1" dirty="0">
-              <a:latin typeface="Arial" panose="020B0604020202020204" pitchFamily="34" charset="0"/>
-              <a:cs typeface="Arial" panose="020B0604020202020204" pitchFamily="34" charset="0"/>
-            </a:endParaRPr>
-          </a:p>
-        </p:txBody>
-      </p:sp>
-      <p:sp>
-        <p:nvSpPr>
-          <p:cNvPr id="33" name="TextBox 32">
-            <a:extLst>
-              <a:ext uri="{FF2B5EF4-FFF2-40B4-BE49-F238E27FC236}">
-                <a16:creationId xmlns:a16="http://schemas.microsoft.com/office/drawing/2014/main" id="{77A18DE9-74C8-4D42-B950-98728DDDCC4E}"/>
-              </a:ext>
-            </a:extLst>
-          </p:cNvPr>
-          <p:cNvSpPr txBox="1"/>
-          <p:nvPr/>
-        </p:nvSpPr>
-        <p:spPr>
-          <a:xfrm rot="16200000">
-            <a:off x="10145125" y="3595230"/>
-            <a:ext cx="1146468" cy="246221"/>
-          </a:xfrm>
-          <a:prstGeom prst="rect">
-            <a:avLst/>
-          </a:prstGeom>
-          <a:solidFill>
-            <a:schemeClr val="bg1"/>
-          </a:solidFill>
-        </p:spPr>
-        <p:txBody>
-          <a:bodyPr wrap="none" rtlCol="0">
-            <a:spAutoFit/>
-          </a:bodyPr>
-          <a:lstStyle/>
-          <a:p>
-            <a:pPr algn="r"/>
-            <a:r>
-              <a:rPr lang="en-US" sz="1000" b="1" dirty="0">
+              <a:t>adj.p</a:t>
+            </a:r>
+            <a:r>
+              <a:rPr lang="en-US" sz="1200" dirty="0">
                 <a:latin typeface="Arial" panose="020B0604020202020204" pitchFamily="34" charset="0"/>
                 <a:cs typeface="Arial" panose="020B0604020202020204" pitchFamily="34" charset="0"/>
               </a:rPr>
-              <a:t>pH 8.0 </a:t>
-            </a:r>
-            <a:r>
-              <a:rPr lang="en-US" sz="1000" b="1" dirty="0">
-                <a:latin typeface="Arial" panose="020B0604020202020204" pitchFamily="34" charset="0"/>
-                <a:cs typeface="Arial" panose="020B0604020202020204" pitchFamily="34" charset="0"/>
-                <a:sym typeface="Wingdings" pitchFamily="2" charset="2"/>
-              </a:rPr>
-              <a:t> pH 7.4</a:t>
-            </a:r>
-            <a:endParaRPr lang="en-US" sz="1000" b="1" dirty="0">
-              <a:latin typeface="Arial" panose="020B0604020202020204" pitchFamily="34" charset="0"/>
-              <a:cs typeface="Arial" panose="020B0604020202020204" pitchFamily="34" charset="0"/>
-            </a:endParaRPr>
-          </a:p>
-        </p:txBody>
-      </p:sp>
-      <p:sp>
-        <p:nvSpPr>
-          <p:cNvPr id="34" name="TextBox 33">
-            <a:extLst>
-              <a:ext uri="{FF2B5EF4-FFF2-40B4-BE49-F238E27FC236}">
-                <a16:creationId xmlns:a16="http://schemas.microsoft.com/office/drawing/2014/main" id="{D51D189D-7E9D-2E4D-9112-15A2971796D1}"/>
-              </a:ext>
-            </a:extLst>
-          </p:cNvPr>
-          <p:cNvSpPr txBox="1"/>
-          <p:nvPr/>
-        </p:nvSpPr>
-        <p:spPr>
-          <a:xfrm rot="16200000">
-            <a:off x="10444239" y="3595230"/>
-            <a:ext cx="1146468" cy="246221"/>
-          </a:xfrm>
-          <a:prstGeom prst="rect">
-            <a:avLst/>
-          </a:prstGeom>
-          <a:solidFill>
-            <a:schemeClr val="bg1"/>
-          </a:solidFill>
-        </p:spPr>
-        <p:txBody>
-          <a:bodyPr wrap="none" rtlCol="0">
-            <a:spAutoFit/>
-          </a:bodyPr>
-          <a:lstStyle/>
-          <a:p>
-            <a:pPr algn="r"/>
-            <a:r>
-              <a:rPr lang="en-US" sz="1000" b="1" dirty="0">
+              <a:t> &lt; 0.005</a:t>
+            </a:r>
+          </a:p>
+          <a:p>
+            <a:r>
+              <a:rPr lang="en-US" sz="2800" baseline="-25000" dirty="0">
                 <a:latin typeface="Arial" panose="020B0604020202020204" pitchFamily="34" charset="0"/>
                 <a:cs typeface="Arial" panose="020B0604020202020204" pitchFamily="34" charset="0"/>
               </a:rPr>
-              <a:t>pH 7.4 </a:t>
-            </a:r>
-            <a:r>
-              <a:rPr lang="en-US" sz="1000" b="1" dirty="0">
-                <a:latin typeface="Arial" panose="020B0604020202020204" pitchFamily="34" charset="0"/>
-                <a:cs typeface="Arial" panose="020B0604020202020204" pitchFamily="34" charset="0"/>
-                <a:sym typeface="Wingdings" pitchFamily="2" charset="2"/>
-              </a:rPr>
-              <a:t> pH 8.0</a:t>
-            </a:r>
-            <a:endParaRPr lang="en-US" sz="1000" b="1" dirty="0">
-              <a:latin typeface="Arial" panose="020B0604020202020204" pitchFamily="34" charset="0"/>
-              <a:cs typeface="Arial" panose="020B0604020202020204" pitchFamily="34" charset="0"/>
-            </a:endParaRPr>
-          </a:p>
-        </p:txBody>
-      </p:sp>
-      <p:sp>
-        <p:nvSpPr>
-          <p:cNvPr id="35" name="TextBox 34">
-            <a:extLst>
-              <a:ext uri="{FF2B5EF4-FFF2-40B4-BE49-F238E27FC236}">
-                <a16:creationId xmlns:a16="http://schemas.microsoft.com/office/drawing/2014/main" id="{4DC9975C-53C6-B44C-87DD-1E86C55C6792}"/>
-              </a:ext>
-            </a:extLst>
-          </p:cNvPr>
-          <p:cNvSpPr txBox="1"/>
-          <p:nvPr/>
-        </p:nvSpPr>
-        <p:spPr>
-          <a:xfrm rot="16200000">
-            <a:off x="10743353" y="3595230"/>
-            <a:ext cx="1146468" cy="246221"/>
-          </a:xfrm>
-          <a:prstGeom prst="rect">
-            <a:avLst/>
-          </a:prstGeom>
-          <a:solidFill>
-            <a:schemeClr val="bg1"/>
-          </a:solidFill>
-        </p:spPr>
-        <p:txBody>
-          <a:bodyPr wrap="none" rtlCol="0">
-            <a:spAutoFit/>
-          </a:bodyPr>
-          <a:lstStyle/>
-          <a:p>
-            <a:pPr algn="r"/>
-            <a:r>
-              <a:rPr lang="en-US" sz="1000" b="1" dirty="0">
+              <a:t>*</a:t>
+            </a:r>
+            <a:r>
+              <a:rPr lang="en-US" sz="1200" dirty="0">
                 <a:latin typeface="Arial" panose="020B0604020202020204" pitchFamily="34" charset="0"/>
                 <a:cs typeface="Arial" panose="020B0604020202020204" pitchFamily="34" charset="0"/>
               </a:rPr>
-              <a:t>pH 7.4 </a:t>
-            </a:r>
-            <a:r>
-              <a:rPr lang="en-US" sz="1000" b="1" dirty="0">
-                <a:latin typeface="Arial" panose="020B0604020202020204" pitchFamily="34" charset="0"/>
-                <a:cs typeface="Arial" panose="020B0604020202020204" pitchFamily="34" charset="0"/>
-                <a:sym typeface="Wingdings" pitchFamily="2" charset="2"/>
-              </a:rPr>
-              <a:t> pH 7.4</a:t>
-            </a:r>
-            <a:endParaRPr lang="en-US" sz="1000" b="1" dirty="0">
-              <a:latin typeface="Arial" panose="020B0604020202020204" pitchFamily="34" charset="0"/>
-              <a:cs typeface="Arial" panose="020B0604020202020204" pitchFamily="34" charset="0"/>
-            </a:endParaRPr>
-          </a:p>
-        </p:txBody>
-      </p:sp>
-      <p:sp>
-        <p:nvSpPr>
-          <p:cNvPr id="36" name="TextBox 35">
-            <a:extLst>
-              <a:ext uri="{FF2B5EF4-FFF2-40B4-BE49-F238E27FC236}">
-                <a16:creationId xmlns:a16="http://schemas.microsoft.com/office/drawing/2014/main" id="{D0788B0D-0634-8847-9BEE-69A81AA0BC5E}"/>
-              </a:ext>
-            </a:extLst>
-          </p:cNvPr>
-          <p:cNvSpPr txBox="1"/>
-          <p:nvPr/>
-        </p:nvSpPr>
-        <p:spPr>
-          <a:xfrm rot="16200000">
-            <a:off x="11013609" y="3595230"/>
-            <a:ext cx="1146468" cy="246221"/>
-          </a:xfrm>
-          <a:prstGeom prst="rect">
-            <a:avLst/>
-          </a:prstGeom>
-          <a:solidFill>
-            <a:schemeClr val="bg1"/>
-          </a:solidFill>
-        </p:spPr>
-        <p:txBody>
-          <a:bodyPr wrap="none" rtlCol="0">
-            <a:spAutoFit/>
-          </a:bodyPr>
-          <a:lstStyle/>
-          <a:p>
-            <a:pPr algn="r"/>
-            <a:r>
-              <a:rPr lang="en-US" sz="1000" b="1" dirty="0">
+              <a:t>  </a:t>
+            </a:r>
+            <a:r>
+              <a:rPr lang="en-US" sz="1200" dirty="0" err="1">
                 <a:latin typeface="Arial" panose="020B0604020202020204" pitchFamily="34" charset="0"/>
                 <a:cs typeface="Arial" panose="020B0604020202020204" pitchFamily="34" charset="0"/>
               </a:rPr>
-              <a:t>pH 7.0 </a:t>
-            </a:r>
-            <a:r>
-              <a:rPr lang="en-US" sz="1000" b="1" dirty="0">
-                <a:latin typeface="Arial" panose="020B0604020202020204" pitchFamily="34" charset="0"/>
-                <a:cs typeface="Arial" panose="020B0604020202020204" pitchFamily="34" charset="0"/>
-                <a:sym typeface="Wingdings" pitchFamily="2" charset="2"/>
-              </a:rPr>
-              <a:t> pH 8.0</a:t>
-            </a:r>
-            <a:endParaRPr lang="en-US" sz="1000" b="1" dirty="0">
-              <a:latin typeface="Arial" panose="020B0604020202020204" pitchFamily="34" charset="0"/>
-              <a:cs typeface="Arial" panose="020B0604020202020204" pitchFamily="34" charset="0"/>
-            </a:endParaRPr>
-          </a:p>
-        </p:txBody>
-      </p:sp>
-      <p:sp>
-        <p:nvSpPr>
-          <p:cNvPr id="37" name="TextBox 36">
-            <a:extLst>
-              <a:ext uri="{FF2B5EF4-FFF2-40B4-BE49-F238E27FC236}">
-                <a16:creationId xmlns:a16="http://schemas.microsoft.com/office/drawing/2014/main" id="{6A29344F-1166-4643-A986-CB7757122C7D}"/>
-              </a:ext>
-            </a:extLst>
-          </p:cNvPr>
-          <p:cNvSpPr txBox="1"/>
-          <p:nvPr/>
-        </p:nvSpPr>
-        <p:spPr>
-          <a:xfrm rot="16200000">
-            <a:off x="11260834" y="3594131"/>
-            <a:ext cx="1146468" cy="246221"/>
-          </a:xfrm>
-          <a:prstGeom prst="rect">
-            <a:avLst/>
-          </a:prstGeom>
-          <a:solidFill>
-            <a:schemeClr val="bg1"/>
-          </a:solidFill>
-        </p:spPr>
-        <p:txBody>
-          <a:bodyPr wrap="none" rtlCol="0">
-            <a:spAutoFit/>
-          </a:bodyPr>
-          <a:lstStyle/>
-          <a:p>
-            <a:pPr algn="r"/>
-            <a:r>
-              <a:rPr lang="en-US" sz="1000" b="1" dirty="0">
+              <a:t>adj.p</a:t>
+            </a:r>
+            <a:r>
+              <a:rPr lang="en-US" sz="1200" dirty="0">
                 <a:latin typeface="Arial" panose="020B0604020202020204" pitchFamily="34" charset="0"/>
                 <a:cs typeface="Arial" panose="020B0604020202020204" pitchFamily="34" charset="0"/>
               </a:rPr>
-              <a:t>pH 7.0 </a:t>
-            </a:r>
-            <a:r>
-              <a:rPr lang="en-US" sz="1000" b="1" dirty="0">
-                <a:latin typeface="Arial" panose="020B0604020202020204" pitchFamily="34" charset="0"/>
-                <a:cs typeface="Arial" panose="020B0604020202020204" pitchFamily="34" charset="0"/>
-                <a:sym typeface="Wingdings" pitchFamily="2" charset="2"/>
-              </a:rPr>
-              <a:t> pH 7.4</a:t>
-            </a:r>
-            <a:endParaRPr lang="en-US" sz="1000" b="1" dirty="0">
-              <a:latin typeface="Arial" panose="020B0604020202020204" pitchFamily="34" charset="0"/>
-              <a:cs typeface="Arial" panose="020B0604020202020204" pitchFamily="34" charset="0"/>
-            </a:endParaRPr>
-          </a:p>
-        </p:txBody>
-      </p:sp>
-      <p:sp>
-        <p:nvSpPr>
-          <p:cNvPr id="38" name="TextBox 37">
-            <a:extLst>
-              <a:ext uri="{FF2B5EF4-FFF2-40B4-BE49-F238E27FC236}">
-                <a16:creationId xmlns:a16="http://schemas.microsoft.com/office/drawing/2014/main" id="{C578369C-AD00-6D4A-99CD-C9990C3C7817}"/>
-              </a:ext>
-            </a:extLst>
-          </p:cNvPr>
-          <p:cNvSpPr txBox="1"/>
-          <p:nvPr/>
-        </p:nvSpPr>
-        <p:spPr>
-          <a:xfrm rot="16200000">
-            <a:off x="1094319" y="3845410"/>
-            <a:ext cx="524503" cy="246221"/>
-          </a:xfrm>
-          <a:prstGeom prst="rect">
-            <a:avLst/>
-          </a:prstGeom>
-          <a:solidFill>
-            <a:schemeClr val="bg1"/>
-          </a:solidFill>
-        </p:spPr>
-        <p:txBody>
-          <a:bodyPr wrap="none" rtlCol="0">
-            <a:spAutoFit/>
-          </a:bodyPr>
-          <a:lstStyle/>
-          <a:p>
-            <a:pPr algn="r"/>
-            <a:r>
-              <a:rPr lang="en-US" sz="1000" b="1" dirty="0">
+              <a:t> &lt; 0.05</a:t>
+            </a:r>
+          </a:p>
+          <a:p>
+            <a:r>
+              <a:rPr lang="en-US" sz="2800" baseline="-25000" dirty="0">
+                <a:solidFill>
+                  <a:schemeClr val="bg1">
+                    <a:lumMod val="50000"/>
+                  </a:schemeClr>
+                </a:solidFill>
                 <a:latin typeface="Arial" panose="020B0604020202020204" pitchFamily="34" charset="0"/>
                 <a:cs typeface="Arial" panose="020B0604020202020204" pitchFamily="34" charset="0"/>
               </a:rPr>
-              <a:t>Day 0</a:t>
-            </a:r>
-          </a:p>
-        </p:txBody>
-      </p:sp>
-      <p:sp>
-        <p:nvSpPr>
-          <p:cNvPr id="39" name="TextBox 38">
-            <a:extLst>
-              <a:ext uri="{FF2B5EF4-FFF2-40B4-BE49-F238E27FC236}">
-                <a16:creationId xmlns:a16="http://schemas.microsoft.com/office/drawing/2014/main" id="{D1F1E00A-84D1-4841-B13E-49D548B26F63}"/>
-              </a:ext>
-            </a:extLst>
-          </p:cNvPr>
-          <p:cNvSpPr txBox="1"/>
-          <p:nvPr/>
-        </p:nvSpPr>
-        <p:spPr>
-          <a:xfrm rot="16200000">
-            <a:off x="1611818" y="3867050"/>
-            <a:ext cx="595036" cy="246221"/>
-          </a:xfrm>
-          <a:prstGeom prst="rect">
-            <a:avLst/>
-          </a:prstGeom>
-          <a:solidFill>
-            <a:schemeClr val="bg1"/>
-          </a:solidFill>
-        </p:spPr>
-        <p:txBody>
-          <a:bodyPr wrap="none" rtlCol="0">
-            <a:spAutoFit/>
-          </a:bodyPr>
-          <a:lstStyle/>
-          <a:p>
-            <a:pPr algn="r"/>
-            <a:r>
-              <a:rPr lang="en-US" sz="1000" b="1" dirty="0">
+              <a:t>*</a:t>
+            </a:r>
+            <a:r>
+              <a:rPr lang="en-US" sz="1200" dirty="0">
                 <a:latin typeface="Arial" panose="020B0604020202020204" pitchFamily="34" charset="0"/>
                 <a:cs typeface="Arial" panose="020B0604020202020204" pitchFamily="34" charset="0"/>
               </a:rPr>
-              <a:t>Day 10</a:t>
-            </a:r>
-          </a:p>
-        </p:txBody>
-      </p:sp>
-      <p:sp>
-        <p:nvSpPr>
-          <p:cNvPr id="40" name="TextBox 39">
-            <a:extLst>
-              <a:ext uri="{FF2B5EF4-FFF2-40B4-BE49-F238E27FC236}">
-                <a16:creationId xmlns:a16="http://schemas.microsoft.com/office/drawing/2014/main" id="{7B1FE10E-2FEE-6549-9684-A0091E8D7018}"/>
-              </a:ext>
-            </a:extLst>
-          </p:cNvPr>
-          <p:cNvSpPr txBox="1"/>
-          <p:nvPr/>
-        </p:nvSpPr>
-        <p:spPr>
-          <a:xfrm rot="16200000">
-            <a:off x="2090898" y="3915942"/>
-            <a:ext cx="665568" cy="246221"/>
-          </a:xfrm>
-          <a:prstGeom prst="rect">
-            <a:avLst/>
-          </a:prstGeom>
-          <a:solidFill>
-            <a:schemeClr val="bg1"/>
-          </a:solidFill>
-        </p:spPr>
-        <p:txBody>
-          <a:bodyPr wrap="none" rtlCol="0">
-            <a:spAutoFit/>
-          </a:bodyPr>
-          <a:lstStyle/>
-          <a:p>
-            <a:pPr algn="r"/>
-            <a:r>
-              <a:rPr lang="en-US" sz="1000" b="1" dirty="0">
+              <a:t>  </a:t>
+            </a:r>
+            <a:r>
+              <a:rPr lang="en-US" sz="1200" dirty="0" err="1">
                 <a:latin typeface="Arial" panose="020B0604020202020204" pitchFamily="34" charset="0"/>
                 <a:cs typeface="Arial" panose="020B0604020202020204" pitchFamily="34" charset="0"/>
               </a:rPr>
-              <a:t>Day 135</a:t>
-            </a:r>
-          </a:p>
-        </p:txBody>
-      </p:sp>
-      <p:sp>
-        <p:nvSpPr>
-          <p:cNvPr id="41" name="TextBox 40">
-            <a:extLst>
-              <a:ext uri="{FF2B5EF4-FFF2-40B4-BE49-F238E27FC236}">
-                <a16:creationId xmlns:a16="http://schemas.microsoft.com/office/drawing/2014/main" id="{C0580698-136C-7F4A-85FA-D32ABCD620F6}"/>
-              </a:ext>
-            </a:extLst>
-          </p:cNvPr>
-          <p:cNvSpPr txBox="1"/>
-          <p:nvPr/>
-        </p:nvSpPr>
-        <p:spPr>
-          <a:xfrm rot="16200000">
-            <a:off x="2605244" y="3918139"/>
-            <a:ext cx="665568" cy="246221"/>
-          </a:xfrm>
-          <a:prstGeom prst="rect">
-            <a:avLst/>
-          </a:prstGeom>
-          <a:solidFill>
-            <a:schemeClr val="bg1"/>
-          </a:solidFill>
-        </p:spPr>
-        <p:txBody>
-          <a:bodyPr wrap="none" rtlCol="0">
-            <a:spAutoFit/>
-          </a:bodyPr>
-          <a:lstStyle/>
-          <a:p>
-            <a:pPr algn="r"/>
-            <a:r>
-              <a:rPr lang="en-US" sz="1000" b="1" dirty="0">
+              <a:t>adj.p</a:t>
+            </a:r>
+            <a:r>
+              <a:rPr lang="en-US" sz="1200" dirty="0">
                 <a:latin typeface="Arial" panose="020B0604020202020204" pitchFamily="34" charset="0"/>
                 <a:cs typeface="Arial" panose="020B0604020202020204" pitchFamily="34" charset="0"/>
               </a:rPr>
-              <a:t>Day 145</a:t>
+              <a:t> &lt; 0.1</a:t>
             </a:r>
           </a:p>
         </p:txBody>
@@ -4327,7 +3673,7 @@
     </p:spTree>
     <p:extLst>
       <p:ext uri="{BB962C8B-B14F-4D97-AF65-F5344CB8AC3E}">
-        <p14:creationId xmlns:p14="http://schemas.microsoft.com/office/powerpoint/2010/main" val="1132546627"/>
+        <p14:creationId xmlns:p14="http://schemas.microsoft.com/office/powerpoint/2010/main" val="3738130696"/>
       </p:ext>
     </p:extLst>
   </p:cSld>
@@ -4356,10 +3702,10 @@
       </p:grpSpPr>
       <p:pic>
         <p:nvPicPr>
-          <p:cNvPr id="5" name="Picture 4">
-            <a:extLst>
-              <a:ext uri="{FF2B5EF4-FFF2-40B4-BE49-F238E27FC236}">
-                <a16:creationId xmlns:a16="http://schemas.microsoft.com/office/drawing/2014/main" id="{E2E4E3CA-CCAD-6148-8635-34CD554E47A8}"/>
+          <p:cNvPr id="7" name="Picture 6">
+            <a:extLst>
+              <a:ext uri="{FF2B5EF4-FFF2-40B4-BE49-F238E27FC236}">
+                <a16:creationId xmlns:a16="http://schemas.microsoft.com/office/drawing/2014/main" id="{E3FC28A6-B69A-FE4D-8F76-6C1DB02DD82C}"/>
               </a:ext>
             </a:extLst>
           </p:cNvPr>
@@ -4370,13 +3716,13 @@
         </p:nvPicPr>
         <p:blipFill rotWithShape="1">
           <a:blip r:embed="rId2"/>
-          <a:srcRect t="26667" r="31529"/>
+          <a:srcRect t="21270" r="29894"/>
           <a:stretch/>
         </p:blipFill>
         <p:spPr>
           <a:xfrm>
-            <a:off x="266699" y="332512"/>
-            <a:ext cx="2893095" cy="4426526"/>
+            <a:off x="64889" y="0"/>
+            <a:ext cx="3152249" cy="5900056"/>
           </a:xfrm>
           <a:prstGeom prst="rect">
             <a:avLst/>
@@ -4385,10 +3731,10 @@
       </p:pic>
       <p:pic>
         <p:nvPicPr>
-          <p:cNvPr id="7" name="Picture 6">
-            <a:extLst>
-              <a:ext uri="{FF2B5EF4-FFF2-40B4-BE49-F238E27FC236}">
-                <a16:creationId xmlns:a16="http://schemas.microsoft.com/office/drawing/2014/main" id="{06CD223B-AF37-FA4B-8863-503BCFC5B5CA}"/>
+          <p:cNvPr id="10" name="Picture 9">
+            <a:extLst>
+              <a:ext uri="{FF2B5EF4-FFF2-40B4-BE49-F238E27FC236}">
+                <a16:creationId xmlns:a16="http://schemas.microsoft.com/office/drawing/2014/main" id="{A3CEB9AD-4CD1-6141-8EAC-01DECE5A6696}"/>
               </a:ext>
             </a:extLst>
           </p:cNvPr>
@@ -4399,13 +3745,13 @@
         </p:nvPicPr>
         <p:blipFill rotWithShape="1">
           <a:blip r:embed="rId3"/>
-          <a:srcRect t="26667" r="37542"/>
+          <a:srcRect t="21904" r="16270"/>
           <a:stretch/>
         </p:blipFill>
         <p:spPr>
           <a:xfrm>
-            <a:off x="3263704" y="332510"/>
-            <a:ext cx="2262040" cy="4426527"/>
+            <a:off x="7117582" y="60051"/>
+            <a:ext cx="5009110" cy="5840005"/>
           </a:xfrm>
           <a:prstGeom prst="rect">
             <a:avLst/>
@@ -4414,10 +3760,10 @@
       </p:pic>
       <p:pic>
         <p:nvPicPr>
-          <p:cNvPr id="9" name="Picture 8">
-            <a:extLst>
-              <a:ext uri="{FF2B5EF4-FFF2-40B4-BE49-F238E27FC236}">
-                <a16:creationId xmlns:a16="http://schemas.microsoft.com/office/drawing/2014/main" id="{DB1CFD60-FD44-4B47-B12C-D1BCA7E6EA52}"/>
+          <p:cNvPr id="12" name="Picture 11">
+            <a:extLst>
+              <a:ext uri="{FF2B5EF4-FFF2-40B4-BE49-F238E27FC236}">
+                <a16:creationId xmlns:a16="http://schemas.microsoft.com/office/drawing/2014/main" id="{FF117520-1C3F-3447-AF7C-A91C72E43259}"/>
               </a:ext>
             </a:extLst>
           </p:cNvPr>
@@ -4428,54 +3774,25 @@
         </p:nvPicPr>
         <p:blipFill rotWithShape="1">
           <a:blip r:embed="rId4"/>
-          <a:srcRect t="26667" r="37542"/>
+          <a:srcRect l="-1" t="22539" r="32011"/>
           <a:stretch/>
         </p:blipFill>
         <p:spPr>
           <a:xfrm>
-            <a:off x="5749631" y="332510"/>
-            <a:ext cx="2262040" cy="4426527"/>
+            <a:off x="3605934" y="60051"/>
+            <a:ext cx="3075576" cy="5840005"/>
           </a:xfrm>
           <a:prstGeom prst="rect">
             <a:avLst/>
           </a:prstGeom>
         </p:spPr>
       </p:pic>
-      <p:pic>
-        <p:nvPicPr>
-          <p:cNvPr id="11" name="Picture 10">
-            <a:extLst>
-              <a:ext uri="{FF2B5EF4-FFF2-40B4-BE49-F238E27FC236}">
-                <a16:creationId xmlns:a16="http://schemas.microsoft.com/office/drawing/2014/main" id="{02D39B9E-3776-F046-9267-4B19D9074CA6}"/>
-              </a:ext>
-            </a:extLst>
-          </p:cNvPr>
-          <p:cNvPicPr>
-            <a:picLocks noChangeAspect="1"/>
-          </p:cNvPicPr>
-          <p:nvPr/>
-        </p:nvPicPr>
-        <p:blipFill rotWithShape="1">
-          <a:blip r:embed="rId5"/>
-          <a:srcRect t="26667" r="21338"/>
-          <a:stretch/>
-        </p:blipFill>
-        <p:spPr>
-          <a:xfrm>
-            <a:off x="8235558" y="332510"/>
-            <a:ext cx="3798521" cy="4426528"/>
-          </a:xfrm>
-          <a:prstGeom prst="rect">
-            <a:avLst/>
-          </a:prstGeom>
-        </p:spPr>
-      </p:pic>
-      <p:sp>
-        <p:nvSpPr>
-          <p:cNvPr id="12" name="TextBox 11">
-            <a:extLst>
-              <a:ext uri="{FF2B5EF4-FFF2-40B4-BE49-F238E27FC236}">
-                <a16:creationId xmlns:a16="http://schemas.microsoft.com/office/drawing/2014/main" id="{B8F89937-A43A-3840-9C5B-64771747817E}"/>
+      <p:sp>
+        <p:nvSpPr>
+          <p:cNvPr id="13" name="TextBox 12">
+            <a:extLst>
+              <a:ext uri="{FF2B5EF4-FFF2-40B4-BE49-F238E27FC236}">
+                <a16:creationId xmlns:a16="http://schemas.microsoft.com/office/drawing/2014/main" id="{F06082DE-3395-754B-907C-D80695069753}"/>
               </a:ext>
             </a:extLst>
           </p:cNvPr>
@@ -4484,7 +3801,7 @@
         </p:nvSpPr>
         <p:spPr>
           <a:xfrm>
-            <a:off x="162789" y="195120"/>
+            <a:off x="64889" y="60051"/>
             <a:ext cx="324128" cy="369332"/>
           </a:xfrm>
           <a:prstGeom prst="rect">
@@ -4507,10 +3824,10 @@
       </p:sp>
       <p:sp>
         <p:nvSpPr>
-          <p:cNvPr id="13" name="TextBox 12">
-            <a:extLst>
-              <a:ext uri="{FF2B5EF4-FFF2-40B4-BE49-F238E27FC236}">
-                <a16:creationId xmlns:a16="http://schemas.microsoft.com/office/drawing/2014/main" id="{33BAF438-7079-B94D-B189-72A32E7B778B}"/>
+          <p:cNvPr id="14" name="TextBox 13">
+            <a:extLst>
+              <a:ext uri="{FF2B5EF4-FFF2-40B4-BE49-F238E27FC236}">
+                <a16:creationId xmlns:a16="http://schemas.microsoft.com/office/drawing/2014/main" id="{F1741959-FCCE-0844-8E9A-5DE06865A932}"/>
               </a:ext>
             </a:extLst>
           </p:cNvPr>
@@ -4519,7 +3836,7 @@
         </p:nvSpPr>
         <p:spPr>
           <a:xfrm>
-            <a:off x="3375633" y="195120"/>
+            <a:off x="3605934" y="60051"/>
             <a:ext cx="324128" cy="369332"/>
           </a:xfrm>
           <a:prstGeom prst="rect">
@@ -4542,10 +3859,10 @@
       </p:sp>
       <p:sp>
         <p:nvSpPr>
-          <p:cNvPr id="14" name="TextBox 13">
-            <a:extLst>
-              <a:ext uri="{FF2B5EF4-FFF2-40B4-BE49-F238E27FC236}">
-                <a16:creationId xmlns:a16="http://schemas.microsoft.com/office/drawing/2014/main" id="{572B4CF8-18A4-3948-9C41-CEA7B03F4AC6}"/>
+          <p:cNvPr id="15" name="TextBox 14">
+            <a:extLst>
+              <a:ext uri="{FF2B5EF4-FFF2-40B4-BE49-F238E27FC236}">
+                <a16:creationId xmlns:a16="http://schemas.microsoft.com/office/drawing/2014/main" id="{2C496509-1087-6A4C-83F5-46BA53AB70A5}"/>
               </a:ext>
             </a:extLst>
           </p:cNvPr>
@@ -4554,7 +3871,7 @@
         </p:nvSpPr>
         <p:spPr>
           <a:xfrm>
-            <a:off x="5927731" y="195120"/>
+            <a:off x="7117582" y="14074"/>
             <a:ext cx="306494" cy="369332"/>
           </a:xfrm>
           <a:prstGeom prst="rect">
@@ -4575,45 +3892,10 @@
           </a:p>
         </p:txBody>
       </p:sp>
-      <p:sp>
-        <p:nvSpPr>
-          <p:cNvPr id="15" name="TextBox 14">
-            <a:extLst>
-              <a:ext uri="{FF2B5EF4-FFF2-40B4-BE49-F238E27FC236}">
-                <a16:creationId xmlns:a16="http://schemas.microsoft.com/office/drawing/2014/main" id="{367893BE-C8BA-BF41-BE0E-03515A9C41FA}"/>
-              </a:ext>
-            </a:extLst>
-          </p:cNvPr>
-          <p:cNvSpPr txBox="1"/>
-          <p:nvPr/>
-        </p:nvSpPr>
-        <p:spPr>
-          <a:xfrm>
-            <a:off x="8296925" y="195120"/>
-            <a:ext cx="330540" cy="369332"/>
-          </a:xfrm>
-          <a:prstGeom prst="rect">
-            <a:avLst/>
-          </a:prstGeom>
-          <a:noFill/>
-        </p:spPr>
-        <p:txBody>
-          <a:bodyPr wrap="none" rtlCol="0">
-            <a:spAutoFit/>
-          </a:bodyPr>
-          <a:lstStyle/>
-          <a:p>
-            <a:r>
-              <a:rPr lang="en-US" b="1" dirty="0"/>
-              <a:t>D</a:t>
-            </a:r>
-          </a:p>
-        </p:txBody>
-      </p:sp>
     </p:spTree>
     <p:extLst>
       <p:ext uri="{BB962C8B-B14F-4D97-AF65-F5344CB8AC3E}">
-        <p14:creationId xmlns:p14="http://schemas.microsoft.com/office/powerpoint/2010/main" val="3793115448"/>
+        <p14:creationId xmlns:p14="http://schemas.microsoft.com/office/powerpoint/2010/main" val="1456203432"/>
       </p:ext>
     </p:extLst>
   </p:cSld>
@@ -4645,7 +3927,7 @@
           <p:cNvPr id="5" name="Picture 4">
             <a:extLst>
               <a:ext uri="{FF2B5EF4-FFF2-40B4-BE49-F238E27FC236}">
-                <a16:creationId xmlns:a16="http://schemas.microsoft.com/office/drawing/2014/main" id="{E7EE740F-F84A-E148-A42B-4C37A2662956}"/>
+                <a16:creationId xmlns:a16="http://schemas.microsoft.com/office/drawing/2014/main" id="{E9AFC4FE-9819-0B41-910E-657A220F5D29}"/>
               </a:ext>
             </a:extLst>
           </p:cNvPr>
@@ -4656,13 +3938,13 @@
         </p:nvPicPr>
         <p:blipFill rotWithShape="1">
           <a:blip r:embed="rId2"/>
-          <a:srcRect t="26667" r="38465" b="3809"/>
+          <a:srcRect t="22795" r="26447" b="2093"/>
           <a:stretch/>
         </p:blipFill>
         <p:spPr>
           <a:xfrm>
-            <a:off x="3291966" y="295221"/>
-            <a:ext cx="2257417" cy="4250854"/>
+            <a:off x="-13208" y="137160"/>
+            <a:ext cx="4607046" cy="6720840"/>
           </a:xfrm>
           <a:prstGeom prst="rect">
             <a:avLst/>
@@ -4674,7 +3956,7 @@
           <p:cNvPr id="7" name="Picture 6">
             <a:extLst>
               <a:ext uri="{FF2B5EF4-FFF2-40B4-BE49-F238E27FC236}">
-                <a16:creationId xmlns:a16="http://schemas.microsoft.com/office/drawing/2014/main" id="{0C56D476-148D-2042-B2CA-740867F1BD9F}"/>
+                <a16:creationId xmlns:a16="http://schemas.microsoft.com/office/drawing/2014/main" id="{82AECB79-2AB8-2646-95F2-2E6CB2D76B06}"/>
               </a:ext>
             </a:extLst>
           </p:cNvPr>
@@ -4683,85 +3965,28 @@
           </p:cNvPicPr>
           <p:nvPr/>
         </p:nvPicPr>
-        <p:blipFill rotWithShape="1">
+        <p:blipFill>
           <a:blip r:embed="rId3"/>
-          <a:srcRect t="26475" r="38148" b="4001"/>
-          <a:stretch/>
+          <a:stretch>
+            <a:fillRect/>
+          </a:stretch>
         </p:blipFill>
         <p:spPr>
           <a:xfrm>
-            <a:off x="5785103" y="295222"/>
-            <a:ext cx="2269062" cy="4250853"/>
+            <a:off x="5249755" y="137160"/>
+            <a:ext cx="3408838" cy="5965466"/>
           </a:xfrm>
           <a:prstGeom prst="rect">
             <a:avLst/>
           </a:prstGeom>
         </p:spPr>
       </p:pic>
-      <p:pic>
-        <p:nvPicPr>
-          <p:cNvPr id="10" name="Picture 9">
-            <a:extLst>
-              <a:ext uri="{FF2B5EF4-FFF2-40B4-BE49-F238E27FC236}">
-                <a16:creationId xmlns:a16="http://schemas.microsoft.com/office/drawing/2014/main" id="{07E69AC6-9A8A-194D-A157-D6AB2E9DFDE6}"/>
-              </a:ext>
-            </a:extLst>
-          </p:cNvPr>
-          <p:cNvPicPr>
-            <a:picLocks noChangeAspect="1"/>
-          </p:cNvPicPr>
-          <p:nvPr/>
-        </p:nvPicPr>
-        <p:blipFill rotWithShape="1">
-          <a:blip r:embed="rId4"/>
-          <a:srcRect t="26667" r="21825"/>
-          <a:stretch/>
-        </p:blipFill>
-        <p:spPr>
-          <a:xfrm>
-            <a:off x="8229485" y="295220"/>
-            <a:ext cx="3858132" cy="4524003"/>
-          </a:xfrm>
-          <a:prstGeom prst="rect">
-            <a:avLst/>
-          </a:prstGeom>
-        </p:spPr>
-      </p:pic>
-      <p:pic>
-        <p:nvPicPr>
-          <p:cNvPr id="12" name="Picture 11">
-            <a:extLst>
-              <a:ext uri="{FF2B5EF4-FFF2-40B4-BE49-F238E27FC236}">
-                <a16:creationId xmlns:a16="http://schemas.microsoft.com/office/drawing/2014/main" id="{66429715-F029-6E44-AD3F-B3C8657EE4B8}"/>
-              </a:ext>
-            </a:extLst>
-          </p:cNvPr>
-          <p:cNvPicPr>
-            <a:picLocks noChangeAspect="1"/>
-          </p:cNvPicPr>
-          <p:nvPr/>
-        </p:nvPicPr>
-        <p:blipFill rotWithShape="1">
-          <a:blip r:embed="rId5"/>
-          <a:srcRect t="26667" r="33033"/>
-          <a:stretch/>
-        </p:blipFill>
-        <p:spPr>
-          <a:xfrm>
-            <a:off x="185353" y="295220"/>
-            <a:ext cx="2891859" cy="4524003"/>
-          </a:xfrm>
-          <a:prstGeom prst="rect">
-            <a:avLst/>
-          </a:prstGeom>
-        </p:spPr>
-      </p:pic>
-      <p:sp>
-        <p:nvSpPr>
-          <p:cNvPr id="13" name="TextBox 12">
-            <a:extLst>
-              <a:ext uri="{FF2B5EF4-FFF2-40B4-BE49-F238E27FC236}">
-                <a16:creationId xmlns:a16="http://schemas.microsoft.com/office/drawing/2014/main" id="{AC906628-E678-EE4D-92BA-1705C4AAD593}"/>
+      <p:sp>
+        <p:nvSpPr>
+          <p:cNvPr id="8" name="TextBox 7">
+            <a:extLst>
+              <a:ext uri="{FF2B5EF4-FFF2-40B4-BE49-F238E27FC236}">
+                <a16:creationId xmlns:a16="http://schemas.microsoft.com/office/drawing/2014/main" id="{9B00238D-F80C-104C-A530-074DF5423676}"/>
               </a:ext>
             </a:extLst>
           </p:cNvPr>
@@ -4770,8 +3995,8 @@
         </p:nvSpPr>
         <p:spPr>
           <a:xfrm>
-            <a:off x="162789" y="67104"/>
-            <a:ext cx="324128" cy="369332"/>
+            <a:off x="7519291" y="3793329"/>
+            <a:ext cx="2720675" cy="830997"/>
           </a:xfrm>
           <a:prstGeom prst="rect">
             <a:avLst/>
@@ -4779,24 +4004,143 @@
           <a:noFill/>
         </p:spPr>
         <p:txBody>
-          <a:bodyPr wrap="none" rtlCol="0">
+          <a:bodyPr wrap="square" rtlCol="0">
             <a:spAutoFit/>
           </a:bodyPr>
           <a:lstStyle/>
           <a:p>
             <a:r>
-              <a:rPr lang="en-US" b="1" dirty="0"/>
-              <a:t>A</a:t>
-            </a:r>
-          </a:p>
-        </p:txBody>
-      </p:sp>
-      <p:sp>
-        <p:nvSpPr>
-          <p:cNvPr id="14" name="TextBox 13">
-            <a:extLst>
-              <a:ext uri="{FF2B5EF4-FFF2-40B4-BE49-F238E27FC236}">
-                <a16:creationId xmlns:a16="http://schemas.microsoft.com/office/drawing/2014/main" id="{53C4B394-762E-7A4C-823B-365FC7F215E2}"/>
+              <a:rPr lang="en-US" baseline="-25000" dirty="0">
+                <a:latin typeface="Arial" panose="020B0604020202020204" pitchFamily="34" charset="0"/>
+                <a:cs typeface="Arial" panose="020B0604020202020204" pitchFamily="34" charset="0"/>
+              </a:rPr>
+              <a:t>***</a:t>
+            </a:r>
+            <a:r>
+              <a:rPr lang="en-US" sz="1000" dirty="0">
+                <a:latin typeface="Arial" panose="020B0604020202020204" pitchFamily="34" charset="0"/>
+                <a:cs typeface="Arial" panose="020B0604020202020204" pitchFamily="34" charset="0"/>
+              </a:rPr>
+              <a:t>  </a:t>
+            </a:r>
+            <a:r>
+              <a:rPr lang="en-US" sz="1000" dirty="0" err="1">
+                <a:latin typeface="Arial" panose="020B0604020202020204" pitchFamily="34" charset="0"/>
+                <a:cs typeface="Arial" panose="020B0604020202020204" pitchFamily="34" charset="0"/>
+              </a:rPr>
+              <a:t>adj.p</a:t>
+            </a:r>
+            <a:r>
+              <a:rPr lang="en-US" sz="1000" dirty="0">
+                <a:latin typeface="Arial" panose="020B0604020202020204" pitchFamily="34" charset="0"/>
+                <a:cs typeface="Arial" panose="020B0604020202020204" pitchFamily="34" charset="0"/>
+              </a:rPr>
+              <a:t> &lt; 0.0005</a:t>
+            </a:r>
+          </a:p>
+          <a:p>
+            <a:r>
+              <a:rPr lang="en-US" baseline="-25000" dirty="0">
+                <a:latin typeface="Arial" panose="020B0604020202020204" pitchFamily="34" charset="0"/>
+                <a:cs typeface="Arial" panose="020B0604020202020204" pitchFamily="34" charset="0"/>
+              </a:rPr>
+              <a:t>**</a:t>
+            </a:r>
+            <a:r>
+              <a:rPr lang="en-US" sz="1000" dirty="0">
+                <a:latin typeface="Arial" panose="020B0604020202020204" pitchFamily="34" charset="0"/>
+                <a:cs typeface="Arial" panose="020B0604020202020204" pitchFamily="34" charset="0"/>
+              </a:rPr>
+              <a:t>  </a:t>
+            </a:r>
+            <a:r>
+              <a:rPr lang="en-US" sz="1000" dirty="0" err="1">
+                <a:latin typeface="Arial" panose="020B0604020202020204" pitchFamily="34" charset="0"/>
+                <a:cs typeface="Arial" panose="020B0604020202020204" pitchFamily="34" charset="0"/>
+              </a:rPr>
+              <a:t>adj.p</a:t>
+            </a:r>
+            <a:r>
+              <a:rPr lang="en-US" sz="1000" dirty="0">
+                <a:latin typeface="Arial" panose="020B0604020202020204" pitchFamily="34" charset="0"/>
+                <a:cs typeface="Arial" panose="020B0604020202020204" pitchFamily="34" charset="0"/>
+              </a:rPr>
+              <a:t> &lt; 0.005</a:t>
+            </a:r>
+          </a:p>
+          <a:p>
+            <a:r>
+              <a:rPr lang="en-US" baseline="-25000" dirty="0">
+                <a:latin typeface="Arial" panose="020B0604020202020204" pitchFamily="34" charset="0"/>
+                <a:cs typeface="Arial" panose="020B0604020202020204" pitchFamily="34" charset="0"/>
+              </a:rPr>
+              <a:t>*</a:t>
+            </a:r>
+            <a:r>
+              <a:rPr lang="en-US" sz="1000" dirty="0">
+                <a:latin typeface="Arial" panose="020B0604020202020204" pitchFamily="34" charset="0"/>
+                <a:cs typeface="Arial" panose="020B0604020202020204" pitchFamily="34" charset="0"/>
+              </a:rPr>
+              <a:t>  </a:t>
+            </a:r>
+            <a:r>
+              <a:rPr lang="en-US" sz="1000" dirty="0" err="1">
+                <a:latin typeface="Arial" panose="020B0604020202020204" pitchFamily="34" charset="0"/>
+                <a:cs typeface="Arial" panose="020B0604020202020204" pitchFamily="34" charset="0"/>
+              </a:rPr>
+              <a:t>adj.p</a:t>
+            </a:r>
+            <a:r>
+              <a:rPr lang="en-US" sz="1000" dirty="0">
+                <a:latin typeface="Arial" panose="020B0604020202020204" pitchFamily="34" charset="0"/>
+                <a:cs typeface="Arial" panose="020B0604020202020204" pitchFamily="34" charset="0"/>
+              </a:rPr>
+              <a:t> &lt; 0.05</a:t>
+            </a:r>
+          </a:p>
+          <a:p>
+            <a:r>
+              <a:rPr lang="en-US" baseline="-25000" dirty="0">
+                <a:solidFill>
+                  <a:schemeClr val="bg1">
+                    <a:lumMod val="50000"/>
+                  </a:schemeClr>
+                </a:solidFill>
+                <a:latin typeface="Arial" panose="020B0604020202020204" pitchFamily="34" charset="0"/>
+                <a:cs typeface="Arial" panose="020B0604020202020204" pitchFamily="34" charset="0"/>
+              </a:rPr>
+              <a:t>*</a:t>
+            </a:r>
+            <a:r>
+              <a:rPr lang="en-US" sz="1000" dirty="0">
+                <a:latin typeface="Arial" panose="020B0604020202020204" pitchFamily="34" charset="0"/>
+                <a:cs typeface="Arial" panose="020B0604020202020204" pitchFamily="34" charset="0"/>
+              </a:rPr>
+              <a:t>  </a:t>
+            </a:r>
+            <a:r>
+              <a:rPr lang="en-US" sz="1000" dirty="0" err="1">
+                <a:latin typeface="Arial" panose="020B0604020202020204" pitchFamily="34" charset="0"/>
+                <a:cs typeface="Arial" panose="020B0604020202020204" pitchFamily="34" charset="0"/>
+              </a:rPr>
+              <a:t>adj.p</a:t>
+            </a:r>
+            <a:r>
+              <a:rPr lang="en-US" sz="1000" dirty="0">
+                <a:latin typeface="Arial" panose="020B0604020202020204" pitchFamily="34" charset="0"/>
+                <a:cs typeface="Arial" panose="020B0604020202020204" pitchFamily="34" charset="0"/>
+              </a:rPr>
+              <a:t> &lt; 0.1</a:t>
+            </a:r>
+          </a:p>
+        </p:txBody>
+      </p:sp>
+      <p:sp>
+        <p:nvSpPr>
+          <p:cNvPr id="9" name="TextBox 8">
+            <a:extLst>
+              <a:ext uri="{FF2B5EF4-FFF2-40B4-BE49-F238E27FC236}">
+                <a16:creationId xmlns:a16="http://schemas.microsoft.com/office/drawing/2014/main" id="{76CEF6F7-174A-684D-A05E-A418832D978E}"/>
               </a:ext>
             </a:extLst>
           </p:cNvPr>
@@ -4805,8 +4149,8 @@
         </p:nvSpPr>
         <p:spPr>
           <a:xfrm>
-            <a:off x="3375633" y="67104"/>
-            <a:ext cx="324128" cy="369332"/>
+            <a:off x="6729492" y="3042735"/>
+            <a:ext cx="415498" cy="369332"/>
           </a:xfrm>
           <a:prstGeom prst="rect">
             <a:avLst/>
@@ -4820,18 +4164,18 @@
           <a:lstStyle/>
           <a:p>
             <a:r>
-              <a:rPr lang="en-US" b="1" dirty="0"/>
-              <a:t>B</a:t>
-            </a:r>
-          </a:p>
-        </p:txBody>
-      </p:sp>
-      <p:sp>
-        <p:nvSpPr>
-          <p:cNvPr id="15" name="TextBox 14">
-            <a:extLst>
-              <a:ext uri="{FF2B5EF4-FFF2-40B4-BE49-F238E27FC236}">
-                <a16:creationId xmlns:a16="http://schemas.microsoft.com/office/drawing/2014/main" id="{668DFE55-A735-B645-89F2-E8527FF97EF9}"/>
+              <a:rPr lang="en-US" dirty="0"/>
+              <a:t>**</a:t>
+            </a:r>
+          </a:p>
+        </p:txBody>
+      </p:sp>
+      <p:sp>
+        <p:nvSpPr>
+          <p:cNvPr id="10" name="TextBox 9">
+            <a:extLst>
+              <a:ext uri="{FF2B5EF4-FFF2-40B4-BE49-F238E27FC236}">
+                <a16:creationId xmlns:a16="http://schemas.microsoft.com/office/drawing/2014/main" id="{9F0A3537-0A2B-2048-B4A4-E03D0F61D3D8}"/>
               </a:ext>
             </a:extLst>
           </p:cNvPr>
@@ -4840,8 +4184,8 @@
         </p:nvSpPr>
         <p:spPr>
           <a:xfrm>
-            <a:off x="5927731" y="67104"/>
-            <a:ext cx="306494" cy="369332"/>
+            <a:off x="6787200" y="621507"/>
+            <a:ext cx="300082" cy="369332"/>
           </a:xfrm>
           <a:prstGeom prst="rect">
             <a:avLst/>
@@ -4855,18 +4199,24 @@
           <a:lstStyle/>
           <a:p>
             <a:r>
-              <a:rPr lang="en-US" b="1" dirty="0"/>
-              <a:t>C</a:t>
-            </a:r>
-          </a:p>
-        </p:txBody>
-      </p:sp>
-      <p:sp>
-        <p:nvSpPr>
-          <p:cNvPr id="16" name="TextBox 15">
-            <a:extLst>
-              <a:ext uri="{FF2B5EF4-FFF2-40B4-BE49-F238E27FC236}">
-                <a16:creationId xmlns:a16="http://schemas.microsoft.com/office/drawing/2014/main" id="{1CEC0E9F-5202-A748-B65E-40A9A3847DF8}"/>
+              <a:rPr lang="en-US" dirty="0">
+                <a:solidFill>
+                  <a:schemeClr val="bg1">
+                    <a:lumMod val="50000"/>
+                  </a:schemeClr>
+                </a:solidFill>
+              </a:rPr>
+              <a:t>*</a:t>
+            </a:r>
+          </a:p>
+        </p:txBody>
+      </p:sp>
+      <p:sp>
+        <p:nvSpPr>
+          <p:cNvPr id="11" name="TextBox 10">
+            <a:extLst>
+              <a:ext uri="{FF2B5EF4-FFF2-40B4-BE49-F238E27FC236}">
+                <a16:creationId xmlns:a16="http://schemas.microsoft.com/office/drawing/2014/main" id="{65472BA9-3AAF-5B4C-8072-B7C114C3221F}"/>
               </a:ext>
             </a:extLst>
           </p:cNvPr>
@@ -4875,8 +4225,8 @@
         </p:nvSpPr>
         <p:spPr>
           <a:xfrm>
-            <a:off x="8296925" y="67104"/>
-            <a:ext cx="330540" cy="369332"/>
+            <a:off x="6787200" y="2417921"/>
+            <a:ext cx="300082" cy="369332"/>
           </a:xfrm>
           <a:prstGeom prst="rect">
             <a:avLst/>
@@ -4890,45 +4240,92 @@
           <a:lstStyle/>
           <a:p>
             <a:r>
-              <a:rPr lang="en-US" b="1" dirty="0"/>
-              <a:t>D</a:t>
-            </a:r>
-          </a:p>
-        </p:txBody>
-      </p:sp>
-      <p:pic>
-        <p:nvPicPr>
-          <p:cNvPr id="18" name="Picture 17">
-            <a:extLst>
-              <a:ext uri="{FF2B5EF4-FFF2-40B4-BE49-F238E27FC236}">
-                <a16:creationId xmlns:a16="http://schemas.microsoft.com/office/drawing/2014/main" id="{AAA686CF-B35C-E042-B265-3252D60AAB5C}"/>
-              </a:ext>
-            </a:extLst>
-          </p:cNvPr>
-          <p:cNvPicPr>
-            <a:picLocks noChangeAspect="1"/>
-          </p:cNvPicPr>
+              <a:rPr lang="en-US" dirty="0">
+                <a:solidFill>
+                  <a:schemeClr val="bg1">
+                    <a:lumMod val="50000"/>
+                  </a:schemeClr>
+                </a:solidFill>
+              </a:rPr>
+              <a:t>*</a:t>
+            </a:r>
+          </a:p>
+        </p:txBody>
+      </p:sp>
+      <p:sp>
+        <p:nvSpPr>
+          <p:cNvPr id="12" name="TextBox 11">
+            <a:extLst>
+              <a:ext uri="{FF2B5EF4-FFF2-40B4-BE49-F238E27FC236}">
+                <a16:creationId xmlns:a16="http://schemas.microsoft.com/office/drawing/2014/main" id="{695294F1-5BB5-3747-823F-263AEBDC8274}"/>
+              </a:ext>
+            </a:extLst>
+          </p:cNvPr>
+          <p:cNvSpPr txBox="1"/>
           <p:nvPr/>
-        </p:nvPicPr>
-        <p:blipFill rotWithShape="1">
-          <a:blip r:embed="rId6"/>
-          <a:srcRect l="12785" t="1" r="12081" b="10435"/>
-          <a:stretch/>
-        </p:blipFill>
-        <p:spPr>
-          <a:xfrm>
-            <a:off x="18999" y="4015463"/>
-            <a:ext cx="1005966" cy="647444"/>
+        </p:nvSpPr>
+        <p:spPr>
+          <a:xfrm>
+            <a:off x="64889" y="60051"/>
+            <a:ext cx="324128" cy="369332"/>
           </a:xfrm>
           <a:prstGeom prst="rect">
             <a:avLst/>
           </a:prstGeom>
-        </p:spPr>
-      </p:pic>
+          <a:noFill/>
+        </p:spPr>
+        <p:txBody>
+          <a:bodyPr wrap="none" rtlCol="0">
+            <a:spAutoFit/>
+          </a:bodyPr>
+          <a:lstStyle/>
+          <a:p>
+            <a:r>
+              <a:rPr lang="en-US" b="1" dirty="0"/>
+              <a:t>A</a:t>
+            </a:r>
+          </a:p>
+        </p:txBody>
+      </p:sp>
+      <p:sp>
+        <p:nvSpPr>
+          <p:cNvPr id="13" name="TextBox 12">
+            <a:extLst>
+              <a:ext uri="{FF2B5EF4-FFF2-40B4-BE49-F238E27FC236}">
+                <a16:creationId xmlns:a16="http://schemas.microsoft.com/office/drawing/2014/main" id="{A3F6D8CE-84FA-884C-A562-3B6626C20DDA}"/>
+              </a:ext>
+            </a:extLst>
+          </p:cNvPr>
+          <p:cNvSpPr txBox="1"/>
+          <p:nvPr/>
+        </p:nvSpPr>
+        <p:spPr>
+          <a:xfrm>
+            <a:off x="5087691" y="60051"/>
+            <a:ext cx="324128" cy="369332"/>
+          </a:xfrm>
+          <a:prstGeom prst="rect">
+            <a:avLst/>
+          </a:prstGeom>
+          <a:noFill/>
+        </p:spPr>
+        <p:txBody>
+          <a:bodyPr wrap="none" rtlCol="0">
+            <a:spAutoFit/>
+          </a:bodyPr>
+          <a:lstStyle/>
+          <a:p>
+            <a:r>
+              <a:rPr lang="en-US" b="1" dirty="0"/>
+              <a:t>B</a:t>
+            </a:r>
+          </a:p>
+        </p:txBody>
+      </p:sp>
     </p:spTree>
     <p:extLst>
       <p:ext uri="{BB962C8B-B14F-4D97-AF65-F5344CB8AC3E}">
-        <p14:creationId xmlns:p14="http://schemas.microsoft.com/office/powerpoint/2010/main" val="2138467894"/>
+        <p14:creationId xmlns:p14="http://schemas.microsoft.com/office/powerpoint/2010/main" val="938451771"/>
       </p:ext>
     </p:extLst>
   </p:cSld>
@@ -4957,10 +4354,10 @@
       </p:grpSpPr>
       <p:pic>
         <p:nvPicPr>
-          <p:cNvPr id="5" name="Picture 4">
-            <a:extLst>
-              <a:ext uri="{FF2B5EF4-FFF2-40B4-BE49-F238E27FC236}">
-                <a16:creationId xmlns:a16="http://schemas.microsoft.com/office/drawing/2014/main" id="{D8F4A6EF-95C3-D043-BF1B-43594DBA9706}"/>
+          <p:cNvPr id="7" name="Picture 6">
+            <a:extLst>
+              <a:ext uri="{FF2B5EF4-FFF2-40B4-BE49-F238E27FC236}">
+                <a16:creationId xmlns:a16="http://schemas.microsoft.com/office/drawing/2014/main" id="{D194C91A-94C6-7F47-969F-E42E6683DC35}"/>
               </a:ext>
             </a:extLst>
           </p:cNvPr>
@@ -4977,20 +4374,80 @@
         </p:blipFill>
         <p:spPr>
           <a:xfrm>
-            <a:off x="1381125" y="0"/>
-            <a:ext cx="9429750" cy="6858000"/>
+            <a:off x="157655" y="3628696"/>
+            <a:ext cx="6227379" cy="3113690"/>
           </a:xfrm>
           <a:prstGeom prst="rect">
             <a:avLst/>
           </a:prstGeom>
         </p:spPr>
       </p:pic>
-      <p:sp>
-        <p:nvSpPr>
-          <p:cNvPr id="6" name="TextBox 5">
-            <a:extLst>
-              <a:ext uri="{FF2B5EF4-FFF2-40B4-BE49-F238E27FC236}">
-                <a16:creationId xmlns:a16="http://schemas.microsoft.com/office/drawing/2014/main" id="{2DFCE3C8-5A13-8B49-B6F5-6902421E6052}"/>
+      <p:pic>
+        <p:nvPicPr>
+          <p:cNvPr id="9" name="Picture 8">
+            <a:extLst>
+              <a:ext uri="{FF2B5EF4-FFF2-40B4-BE49-F238E27FC236}">
+                <a16:creationId xmlns:a16="http://schemas.microsoft.com/office/drawing/2014/main" id="{4E598AFD-06E5-7249-8205-69F23BBBB9D5}"/>
+              </a:ext>
+            </a:extLst>
+          </p:cNvPr>
+          <p:cNvPicPr>
+            <a:picLocks noChangeAspect="1"/>
+          </p:cNvPicPr>
+          <p:nvPr/>
+        </p:nvPicPr>
+        <p:blipFill>
+          <a:blip r:embed="rId3"/>
+          <a:stretch>
+            <a:fillRect/>
+          </a:stretch>
+        </p:blipFill>
+        <p:spPr>
+          <a:xfrm>
+            <a:off x="551793" y="381000"/>
+            <a:ext cx="4240924" cy="3180693"/>
+          </a:xfrm>
+          <a:prstGeom prst="rect">
+            <a:avLst/>
+          </a:prstGeom>
+        </p:spPr>
+      </p:pic>
+      <p:pic>
+        <p:nvPicPr>
+          <p:cNvPr id="21" name="Picture 20">
+            <a:extLst>
+              <a:ext uri="{FF2B5EF4-FFF2-40B4-BE49-F238E27FC236}">
+                <a16:creationId xmlns:a16="http://schemas.microsoft.com/office/drawing/2014/main" id="{A4D2BF60-D4F8-1943-808A-59FB8FB81844}"/>
+              </a:ext>
+            </a:extLst>
+          </p:cNvPr>
+          <p:cNvPicPr>
+            <a:picLocks noChangeAspect="1"/>
+          </p:cNvPicPr>
+          <p:nvPr/>
+        </p:nvPicPr>
+        <p:blipFill>
+          <a:blip r:embed="rId4"/>
+          <a:stretch>
+            <a:fillRect/>
+          </a:stretch>
+        </p:blipFill>
+        <p:spPr>
+          <a:xfrm>
+            <a:off x="6602749" y="337207"/>
+            <a:ext cx="5589251" cy="6520793"/>
+          </a:xfrm>
+          <a:prstGeom prst="rect">
+            <a:avLst/>
+          </a:prstGeom>
+        </p:spPr>
+      </p:pic>
+      <p:sp>
+        <p:nvSpPr>
+          <p:cNvPr id="22" name="TextBox 21">
+            <a:extLst>
+              <a:ext uri="{FF2B5EF4-FFF2-40B4-BE49-F238E27FC236}">
+                <a16:creationId xmlns:a16="http://schemas.microsoft.com/office/drawing/2014/main" id="{B408B461-8D78-F54A-83BD-B946CA558667}"/>
               </a:ext>
             </a:extLst>
           </p:cNvPr>
@@ -4999,8 +4456,8 @@
         </p:nvSpPr>
         <p:spPr>
           <a:xfrm>
-            <a:off x="3060192" y="487680"/>
-            <a:ext cx="415498" cy="369332"/>
+            <a:off x="64889" y="60051"/>
+            <a:ext cx="324128" cy="369332"/>
           </a:xfrm>
           <a:prstGeom prst="rect">
             <a:avLst/>
@@ -5014,18 +4471,18 @@
           <a:lstStyle/>
           <a:p>
             <a:r>
-              <a:rPr lang="en-US" dirty="0"/>
-              <a:t>**</a:t>
-            </a:r>
-          </a:p>
-        </p:txBody>
-      </p:sp>
-      <p:sp>
-        <p:nvSpPr>
-          <p:cNvPr id="7" name="TextBox 6">
-            <a:extLst>
-              <a:ext uri="{FF2B5EF4-FFF2-40B4-BE49-F238E27FC236}">
-                <a16:creationId xmlns:a16="http://schemas.microsoft.com/office/drawing/2014/main" id="{628273F0-9DF4-804B-ADC4-A259989344D5}"/>
+              <a:rPr lang="en-US" b="1" dirty="0"/>
+              <a:t>A</a:t>
+            </a:r>
+          </a:p>
+        </p:txBody>
+      </p:sp>
+      <p:sp>
+        <p:nvSpPr>
+          <p:cNvPr id="23" name="TextBox 22">
+            <a:extLst>
+              <a:ext uri="{FF2B5EF4-FFF2-40B4-BE49-F238E27FC236}">
+                <a16:creationId xmlns:a16="http://schemas.microsoft.com/office/drawing/2014/main" id="{AEECC95A-066E-EC4A-8B2E-97D564E67956}"/>
               </a:ext>
             </a:extLst>
           </p:cNvPr>
@@ -5034,8 +4491,8 @@
         </p:nvSpPr>
         <p:spPr>
           <a:xfrm>
-            <a:off x="3116434" y="1160026"/>
-            <a:ext cx="300082" cy="369332"/>
+            <a:off x="118808" y="3197616"/>
+            <a:ext cx="314510" cy="369332"/>
           </a:xfrm>
           <a:prstGeom prst="rect">
             <a:avLst/>
@@ -5049,24 +4506,18 @@
           <a:lstStyle/>
           <a:p>
             <a:r>
-              <a:rPr lang="en-US" dirty="0">
-                <a:solidFill>
-                  <a:schemeClr val="bg1">
-                    <a:lumMod val="50000"/>
-                  </a:schemeClr>
-                </a:solidFill>
-              </a:rPr>
-              <a:t>*</a:t>
-            </a:r>
-          </a:p>
-        </p:txBody>
-      </p:sp>
-      <p:sp>
-        <p:nvSpPr>
-          <p:cNvPr id="8" name="TextBox 7">
-            <a:extLst>
-              <a:ext uri="{FF2B5EF4-FFF2-40B4-BE49-F238E27FC236}">
-                <a16:creationId xmlns:a16="http://schemas.microsoft.com/office/drawing/2014/main" id="{F97865E3-5A3D-2640-A43C-8D134574059A}"/>
+              <a:rPr lang="en-US" b="1" dirty="0"/>
+              <a:t>B</a:t>
+            </a:r>
+          </a:p>
+        </p:txBody>
+      </p:sp>
+      <p:sp>
+        <p:nvSpPr>
+          <p:cNvPr id="24" name="TextBox 23">
+            <a:extLst>
+              <a:ext uri="{FF2B5EF4-FFF2-40B4-BE49-F238E27FC236}">
+                <a16:creationId xmlns:a16="http://schemas.microsoft.com/office/drawing/2014/main" id="{7486F49D-E86D-B24D-B070-32B68A3B69E9}"/>
               </a:ext>
             </a:extLst>
           </p:cNvPr>
@@ -5075,8 +4526,8 @@
         </p:nvSpPr>
         <p:spPr>
           <a:xfrm>
-            <a:off x="3116434" y="3244334"/>
-            <a:ext cx="300082" cy="369332"/>
+            <a:off x="6380058" y="152541"/>
+            <a:ext cx="306494" cy="369332"/>
           </a:xfrm>
           <a:prstGeom prst="rect">
             <a:avLst/>
@@ -5090,24 +4541,18 @@
           <a:lstStyle/>
           <a:p>
             <a:r>
-              <a:rPr lang="en-US" dirty="0">
-                <a:solidFill>
-                  <a:schemeClr val="bg1">
-                    <a:lumMod val="50000"/>
-                  </a:schemeClr>
-                </a:solidFill>
-              </a:rPr>
-              <a:t>*</a:t>
-            </a:r>
-          </a:p>
-        </p:txBody>
-      </p:sp>
-      <p:sp>
-        <p:nvSpPr>
-          <p:cNvPr id="9" name="TextBox 8">
-            <a:extLst>
-              <a:ext uri="{FF2B5EF4-FFF2-40B4-BE49-F238E27FC236}">
-                <a16:creationId xmlns:a16="http://schemas.microsoft.com/office/drawing/2014/main" id="{A67B829E-0D19-2944-90FE-67D591185874}"/>
+              <a:rPr lang="en-US" b="1" dirty="0"/>
+              <a:t>C</a:t>
+            </a:r>
+          </a:p>
+        </p:txBody>
+      </p:sp>
+      <p:sp>
+        <p:nvSpPr>
+          <p:cNvPr id="26" name="TextBox 25">
+            <a:extLst>
+              <a:ext uri="{FF2B5EF4-FFF2-40B4-BE49-F238E27FC236}">
+                <a16:creationId xmlns:a16="http://schemas.microsoft.com/office/drawing/2014/main" id="{D4B3A8E7-0AB5-AD4B-A78F-9888C84ECF11}"/>
               </a:ext>
             </a:extLst>
           </p:cNvPr>
@@ -5116,8 +4561,8 @@
         </p:nvSpPr>
         <p:spPr>
           <a:xfrm>
-            <a:off x="5090060" y="487680"/>
-            <a:ext cx="300082" cy="369332"/>
+            <a:off x="1150883" y="195688"/>
+            <a:ext cx="542136" cy="246221"/>
           </a:xfrm>
           <a:prstGeom prst="rect">
             <a:avLst/>
@@ -5131,18 +4576,21 @@
           <a:lstStyle/>
           <a:p>
             <a:r>
-              <a:rPr lang="en-US" dirty="0"/>
-              <a:t>*</a:t>
-            </a:r>
-          </a:p>
-        </p:txBody>
-      </p:sp>
-      <p:sp>
-        <p:nvSpPr>
-          <p:cNvPr id="10" name="TextBox 9">
-            <a:extLst>
-              <a:ext uri="{FF2B5EF4-FFF2-40B4-BE49-F238E27FC236}">
-                <a16:creationId xmlns:a16="http://schemas.microsoft.com/office/drawing/2014/main" id="{A0DE985A-F2B0-6143-8CE2-AF3C8C05BC7E}"/>
+              <a:rPr lang="en-US" sz="1000" dirty="0">
+                <a:latin typeface="Arial" panose="020B0604020202020204" pitchFamily="34" charset="0"/>
+                <a:cs typeface="Arial" panose="020B0604020202020204" pitchFamily="34" charset="0"/>
+              </a:rPr>
+              <a:t>n = 41</a:t>
+            </a:r>
+          </a:p>
+        </p:txBody>
+      </p:sp>
+      <p:sp>
+        <p:nvSpPr>
+          <p:cNvPr id="27" name="TextBox 26">
+            <a:extLst>
+              <a:ext uri="{FF2B5EF4-FFF2-40B4-BE49-F238E27FC236}">
+                <a16:creationId xmlns:a16="http://schemas.microsoft.com/office/drawing/2014/main" id="{8B7F4E35-987C-3148-BF84-7069FA329006}"/>
               </a:ext>
             </a:extLst>
           </p:cNvPr>
@@ -5151,8 +4599,8 @@
         </p:nvSpPr>
         <p:spPr>
           <a:xfrm>
-            <a:off x="8791415" y="491252"/>
-            <a:ext cx="530915" cy="369332"/>
+            <a:off x="1893745" y="195688"/>
+            <a:ext cx="542136" cy="246221"/>
           </a:xfrm>
           <a:prstGeom prst="rect">
             <a:avLst/>
@@ -5166,18 +4614,21 @@
           <a:lstStyle/>
           <a:p>
             <a:r>
-              <a:rPr lang="en-US" dirty="0"/>
-              <a:t>***</a:t>
-            </a:r>
-          </a:p>
-        </p:txBody>
-      </p:sp>
-      <p:sp>
-        <p:nvSpPr>
-          <p:cNvPr id="11" name="TextBox 10">
-            <a:extLst>
-              <a:ext uri="{FF2B5EF4-FFF2-40B4-BE49-F238E27FC236}">
-                <a16:creationId xmlns:a16="http://schemas.microsoft.com/office/drawing/2014/main" id="{37977360-9BF8-9A4C-93E1-92D3703A6D63}"/>
+              <a:rPr lang="en-US" sz="1000" dirty="0">
+                <a:latin typeface="Arial" panose="020B0604020202020204" pitchFamily="34" charset="0"/>
+                <a:cs typeface="Arial" panose="020B0604020202020204" pitchFamily="34" charset="0"/>
+              </a:rPr>
+              <a:t>n = 22</a:t>
+            </a:r>
+          </a:p>
+        </p:txBody>
+      </p:sp>
+      <p:sp>
+        <p:nvSpPr>
+          <p:cNvPr id="28" name="TextBox 27">
+            <a:extLst>
+              <a:ext uri="{FF2B5EF4-FFF2-40B4-BE49-F238E27FC236}">
+                <a16:creationId xmlns:a16="http://schemas.microsoft.com/office/drawing/2014/main" id="{BD850F34-6741-234E-9D79-2B3483835490}"/>
               </a:ext>
             </a:extLst>
           </p:cNvPr>
@@ -5186,8 +4637,8 @@
         </p:nvSpPr>
         <p:spPr>
           <a:xfrm>
-            <a:off x="8906831" y="1444014"/>
-            <a:ext cx="300082" cy="369332"/>
+            <a:off x="2572353" y="195688"/>
+            <a:ext cx="542136" cy="246221"/>
           </a:xfrm>
           <a:prstGeom prst="rect">
             <a:avLst/>
@@ -5201,18 +4652,21 @@
           <a:lstStyle/>
           <a:p>
             <a:r>
-              <a:rPr lang="en-US" dirty="0"/>
-              <a:t>*</a:t>
-            </a:r>
-          </a:p>
-        </p:txBody>
-      </p:sp>
-      <p:sp>
-        <p:nvSpPr>
-          <p:cNvPr id="13" name="TextBox 12">
-            <a:extLst>
-              <a:ext uri="{FF2B5EF4-FFF2-40B4-BE49-F238E27FC236}">
-                <a16:creationId xmlns:a16="http://schemas.microsoft.com/office/drawing/2014/main" id="{1D5D8DB6-F64A-534A-990A-7AF8ECA2C5C3}"/>
+              <a:rPr lang="en-US" sz="1000" dirty="0">
+                <a:latin typeface="Arial" panose="020B0604020202020204" pitchFamily="34" charset="0"/>
+                <a:cs typeface="Arial" panose="020B0604020202020204" pitchFamily="34" charset="0"/>
+              </a:rPr>
+              <a:t>n = 37</a:t>
+            </a:r>
+          </a:p>
+        </p:txBody>
+      </p:sp>
+      <p:sp>
+        <p:nvSpPr>
+          <p:cNvPr id="29" name="TextBox 28">
+            <a:extLst>
+              <a:ext uri="{FF2B5EF4-FFF2-40B4-BE49-F238E27FC236}">
+                <a16:creationId xmlns:a16="http://schemas.microsoft.com/office/drawing/2014/main" id="{C193F1E8-0C63-EE42-9C96-0A470E8AEB90}"/>
               </a:ext>
             </a:extLst>
           </p:cNvPr>
@@ -5221,8 +4675,8 @@
         </p:nvSpPr>
         <p:spPr>
           <a:xfrm>
-            <a:off x="8906831" y="2641354"/>
-            <a:ext cx="300082" cy="369332"/>
+            <a:off x="3260215" y="195688"/>
+            <a:ext cx="542136" cy="246221"/>
           </a:xfrm>
           <a:prstGeom prst="rect">
             <a:avLst/>
@@ -5236,168 +4690,11 @@
           <a:lstStyle/>
           <a:p>
             <a:r>
-              <a:rPr lang="en-US" dirty="0">
-                <a:solidFill>
-                  <a:schemeClr val="bg1">
-                    <a:lumMod val="50000"/>
-                  </a:schemeClr>
-                </a:solidFill>
-              </a:rPr>
-              <a:t>*</a:t>
-            </a:r>
-          </a:p>
-        </p:txBody>
-      </p:sp>
-      <p:sp>
-        <p:nvSpPr>
-          <p:cNvPr id="14" name="TextBox 13">
-            <a:extLst>
-              <a:ext uri="{FF2B5EF4-FFF2-40B4-BE49-F238E27FC236}">
-                <a16:creationId xmlns:a16="http://schemas.microsoft.com/office/drawing/2014/main" id="{7C570E75-8C10-AB4D-B1A8-ED41538D4270}"/>
-              </a:ext>
-            </a:extLst>
-          </p:cNvPr>
-          <p:cNvSpPr txBox="1"/>
-          <p:nvPr/>
-        </p:nvSpPr>
-        <p:spPr>
-          <a:xfrm>
-            <a:off x="9634654" y="4014439"/>
-            <a:ext cx="2720675" cy="1241365"/>
-          </a:xfrm>
-          <a:prstGeom prst="rect">
-            <a:avLst/>
-          </a:prstGeom>
-          <a:noFill/>
-        </p:spPr>
-        <p:txBody>
-          <a:bodyPr wrap="square" rtlCol="0">
-            <a:spAutoFit/>
-          </a:bodyPr>
-          <a:lstStyle/>
-          <a:p>
-            <a:r>
-              <a:rPr lang="en-US" sz="2800" baseline="-25000" dirty="0">
+              <a:rPr lang="en-US" sz="1000" dirty="0">
                 <a:latin typeface="Arial" panose="020B0604020202020204" pitchFamily="34" charset="0"/>
                 <a:cs typeface="Arial" panose="020B0604020202020204" pitchFamily="34" charset="0"/>
               </a:rPr>
-              <a:t>***</a:t>
-            </a:r>
-            <a:r>
-              <a:rPr lang="en-US" sz="1200" dirty="0">
-                <a:latin typeface="Arial" panose="020B0604020202020204" pitchFamily="34" charset="0"/>
-                <a:cs typeface="Arial" panose="020B0604020202020204" pitchFamily="34" charset="0"/>
-              </a:rPr>
-              <a:t>  </a:t>
-            </a:r>
-            <a:r>
-              <a:rPr lang="en-US" sz="1200" dirty="0" err="1">
-                <a:latin typeface="Arial" panose="020B0604020202020204" pitchFamily="34" charset="0"/>
-                <a:cs typeface="Arial" panose="020B0604020202020204" pitchFamily="34" charset="0"/>
-              </a:rPr>
-              <a:t>adj.p</a:t>
-            </a:r>
-            <a:r>
-              <a:rPr lang="en-US" sz="1200" dirty="0">
-                <a:latin typeface="Arial" panose="020B0604020202020204" pitchFamily="34" charset="0"/>
-                <a:cs typeface="Arial" panose="020B0604020202020204" pitchFamily="34" charset="0"/>
-              </a:rPr>
-              <a:t> &lt; 0.0005</a:t>
-            </a:r>
-          </a:p>
-          <a:p>
-            <a:r>
-              <a:rPr lang="en-US" sz="2800" baseline="-25000" dirty="0">
-                <a:latin typeface="Arial" panose="020B0604020202020204" pitchFamily="34" charset="0"/>
-                <a:cs typeface="Arial" panose="020B0604020202020204" pitchFamily="34" charset="0"/>
-              </a:rPr>
-              <a:t>**</a:t>
-            </a:r>
-            <a:r>
-              <a:rPr lang="en-US" sz="1200" dirty="0">
-                <a:latin typeface="Arial" panose="020B0604020202020204" pitchFamily="34" charset="0"/>
-                <a:cs typeface="Arial" panose="020B0604020202020204" pitchFamily="34" charset="0"/>
-              </a:rPr>
-              <a:t>  </a:t>
-            </a:r>
-            <a:r>
-              <a:rPr lang="en-US" sz="1200" dirty="0" err="1">
-                <a:latin typeface="Arial" panose="020B0604020202020204" pitchFamily="34" charset="0"/>
-                <a:cs typeface="Arial" panose="020B0604020202020204" pitchFamily="34" charset="0"/>
-              </a:rPr>
-              <a:t>adj.p</a:t>
-            </a:r>
-            <a:r>
-              <a:rPr lang="en-US" sz="1200" dirty="0">
-                <a:latin typeface="Arial" panose="020B0604020202020204" pitchFamily="34" charset="0"/>
-                <a:cs typeface="Arial" panose="020B0604020202020204" pitchFamily="34" charset="0"/>
-              </a:rPr>
-              <a:t> &lt; 0.005</a:t>
-            </a:r>
-          </a:p>
-          <a:p>
-            <a:r>
-              <a:rPr lang="en-US" sz="2800" baseline="-25000" dirty="0">
-                <a:latin typeface="Arial" panose="020B0604020202020204" pitchFamily="34" charset="0"/>
-                <a:cs typeface="Arial" panose="020B0604020202020204" pitchFamily="34" charset="0"/>
-              </a:rPr>
-              <a:t>*</a:t>
-            </a:r>
-            <a:r>
-              <a:rPr lang="en-US" sz="1200" dirty="0">
-                <a:latin typeface="Arial" panose="020B0604020202020204" pitchFamily="34" charset="0"/>
-                <a:cs typeface="Arial" panose="020B0604020202020204" pitchFamily="34" charset="0"/>
-              </a:rPr>
-              <a:t>  </a:t>
-            </a:r>
-            <a:r>
-              <a:rPr lang="en-US" sz="1200" dirty="0" err="1">
-                <a:latin typeface="Arial" panose="020B0604020202020204" pitchFamily="34" charset="0"/>
-                <a:cs typeface="Arial" panose="020B0604020202020204" pitchFamily="34" charset="0"/>
-              </a:rPr>
-              <a:t>adj.p</a:t>
-            </a:r>
-            <a:r>
-              <a:rPr lang="en-US" sz="1200" dirty="0">
-                <a:latin typeface="Arial" panose="020B0604020202020204" pitchFamily="34" charset="0"/>
-                <a:cs typeface="Arial" panose="020B0604020202020204" pitchFamily="34" charset="0"/>
-              </a:rPr>
-              <a:t> &lt; 0.05</a:t>
-            </a:r>
-          </a:p>
-          <a:p>
-            <a:r>
-              <a:rPr lang="en-US" sz="2800" baseline="-25000" dirty="0">
-                <a:solidFill>
-                  <a:schemeClr val="bg1">
-                    <a:lumMod val="50000"/>
-                  </a:schemeClr>
-                </a:solidFill>
-                <a:latin typeface="Arial" panose="020B0604020202020204" pitchFamily="34" charset="0"/>
-                <a:cs typeface="Arial" panose="020B0604020202020204" pitchFamily="34" charset="0"/>
-              </a:rPr>
-              <a:t>*</a:t>
-            </a:r>
-            <a:r>
-              <a:rPr lang="en-US" sz="1200" dirty="0">
-                <a:latin typeface="Arial" panose="020B0604020202020204" pitchFamily="34" charset="0"/>
-                <a:cs typeface="Arial" panose="020B0604020202020204" pitchFamily="34" charset="0"/>
-              </a:rPr>
-              <a:t>  </a:t>
-            </a:r>
-            <a:r>
-              <a:rPr lang="en-US" sz="1200" dirty="0" err="1">
-                <a:latin typeface="Arial" panose="020B0604020202020204" pitchFamily="34" charset="0"/>
-                <a:cs typeface="Arial" panose="020B0604020202020204" pitchFamily="34" charset="0"/>
-              </a:rPr>
-              <a:t>adj.p</a:t>
-            </a:r>
-            <a:r>
-              <a:rPr lang="en-US" sz="1200" dirty="0">
-                <a:latin typeface="Arial" panose="020B0604020202020204" pitchFamily="34" charset="0"/>
-                <a:cs typeface="Arial" panose="020B0604020202020204" pitchFamily="34" charset="0"/>
-              </a:rPr>
-              <a:t> &lt; 0.05</a:t>
+              <a:t>n = 78</a:t>
             </a:r>
           </a:p>
         </p:txBody>
@@ -5405,7 +4702,7 @@
     </p:spTree>
     <p:extLst>
       <p:ext uri="{BB962C8B-B14F-4D97-AF65-F5344CB8AC3E}">
-        <p14:creationId xmlns:p14="http://schemas.microsoft.com/office/powerpoint/2010/main" val="4143407245"/>
+        <p14:creationId xmlns:p14="http://schemas.microsoft.com/office/powerpoint/2010/main" val="1304543853"/>
       </p:ext>
     </p:extLst>
   </p:cSld>

</xml_diff>